<commit_message>
tdf#59323: pptx import: import footer fields as properties
Makes footer, slidenum and datetime placeholders that are inserted to
the slides themselves on pptx files imported as slide properties if it
is possible to do so without losing information (style, position etc.)

If that is not the case and the footers have some special style applied
to them that isn't inherited from master slides, fallbacks to the current
implementation importing them as shapes.

Also since the default way of displaying slide footers in LO use the
respective text fields on master slides, information in master/layout
slide datetime and footer placeholders respectively get replaced with
<date/time> text fields and <footer> text fields.

Change-Id: Ib2f7d18103b62c0c9a8453e01cfd2fd1aa1d39af
Reviewed-on: https://gerrit.libreoffice.org/c/core/+/117008
Tested-by: Jenkins
Reviewed-by: Miklos Vajna <vmiklos@collabora.com>
</commit_message>
<xml_diff>
--- a/sd/qa/unit/data/pptx/numfmt.pptx
+++ b/sd/qa/unit/data/pptx/numfmt.pptx
@@ -113,6 +113,22 @@
       </a:defRPr>
     </a:lvl9pPr>
   </p:defaultTextStyle>
+  <p:extLst>
+    <p:ext uri="{EFAFB233-063F-42B5-8137-9DF3F51BA10A}">
+      <p15:sldGuideLst xmlns:p15="http://schemas.microsoft.com/office/powerpoint/2012/main">
+        <p15:guide id="1" orient="horz" pos="2160">
+          <p15:clr>
+            <a:srgbClr val="A4A3A4"/>
+          </p15:clr>
+        </p15:guide>
+        <p15:guide id="2" pos="2880">
+          <p15:clr>
+            <a:srgbClr val="A4A3A4"/>
+          </p15:clr>
+        </p15:guide>
+      </p15:sldGuideLst>
+    </p:ext>
+  </p:extLst>
 </p:presentation>
 </file>
 
@@ -198,7 +214,7 @@
           <a:p>
             <a:fld id="{8C6B8BEB-E207-4B62-80DE-045147C8EED1}" type="datetimeFigureOut">
               <a:rPr lang="en-US" smtClean="0"/>
-              <a:t>1/27/2016</a:t>
+              <a:t>6/9/2021</a:t>
             </a:fld>
             <a:endParaRPr lang="en-IN"/>
           </a:p>
@@ -264,35 +280,35 @@
           <a:p>
             <a:pPr lvl="0"/>
             <a:r>
-              <a:rPr lang="en-US" smtClean="0"/>
+              <a:rPr lang="en-US"/>
               <a:t>Click to edit Master text styles</a:t>
             </a:r>
           </a:p>
           <a:p>
             <a:pPr lvl="1"/>
             <a:r>
-              <a:rPr lang="en-US" smtClean="0"/>
+              <a:rPr lang="en-US"/>
               <a:t>Second level</a:t>
             </a:r>
           </a:p>
           <a:p>
             <a:pPr lvl="2"/>
             <a:r>
-              <a:rPr lang="en-US" smtClean="0"/>
+              <a:rPr lang="en-US"/>
               <a:t>Third level</a:t>
             </a:r>
           </a:p>
           <a:p>
             <a:pPr lvl="3"/>
             <a:r>
-              <a:rPr lang="en-US" smtClean="0"/>
+              <a:rPr lang="en-US"/>
               <a:t>Fourth level</a:t>
             </a:r>
           </a:p>
           <a:p>
             <a:pPr lvl="4"/>
             <a:r>
-              <a:rPr lang="en-US" smtClean="0"/>
+              <a:rPr lang="en-US"/>
               <a:t>Fifth level</a:t>
             </a:r>
             <a:endParaRPr lang="en-IN"/>
@@ -501,7 +517,7 @@
           <a:lstStyle/>
           <a:p>
             <a:r>
-              <a:rPr lang="en-US" smtClean="0"/>
+              <a:rPr lang="en-US"/>
               <a:t>Click to edit Master title style</a:t>
             </a:r>
             <a:endParaRPr lang="en-IN"/>
@@ -620,7 +636,7 @@
           </a:lstStyle>
           <a:p>
             <a:r>
-              <a:rPr lang="en-US" smtClean="0"/>
+              <a:rPr lang="en-US"/>
               <a:t>Click to edit Master subtitle style</a:t>
             </a:r>
             <a:endParaRPr lang="en-IN"/>
@@ -644,7 +660,7 @@
           <a:p>
             <a:fld id="{23270E89-3869-447B-8CDE-6FB960193F88}" type="datetime4">
               <a:rPr lang="en-IN" smtClean="0"/>
-              <a:t>27 January 2016</a:t>
+              <a:t>09 June 2021</a:t>
             </a:fld>
             <a:endParaRPr lang="en-IN"/>
           </a:p>
@@ -733,7 +749,7 @@
           <a:lstStyle/>
           <a:p>
             <a:r>
-              <a:rPr lang="en-US" smtClean="0"/>
+              <a:rPr lang="en-US"/>
               <a:t>Click to edit Master title style</a:t>
             </a:r>
             <a:endParaRPr lang="en-IN"/>
@@ -757,35 +773,35 @@
           <a:p>
             <a:pPr lvl="0"/>
             <a:r>
-              <a:rPr lang="en-US" smtClean="0"/>
+              <a:rPr lang="en-US"/>
               <a:t>Click to edit Master text styles</a:t>
             </a:r>
           </a:p>
           <a:p>
             <a:pPr lvl="1"/>
             <a:r>
-              <a:rPr lang="en-US" smtClean="0"/>
+              <a:rPr lang="en-US"/>
               <a:t>Second level</a:t>
             </a:r>
           </a:p>
           <a:p>
             <a:pPr lvl="2"/>
             <a:r>
-              <a:rPr lang="en-US" smtClean="0"/>
+              <a:rPr lang="en-US"/>
               <a:t>Third level</a:t>
             </a:r>
           </a:p>
           <a:p>
             <a:pPr lvl="3"/>
             <a:r>
-              <a:rPr lang="en-US" smtClean="0"/>
+              <a:rPr lang="en-US"/>
               <a:t>Fourth level</a:t>
             </a:r>
           </a:p>
           <a:p>
             <a:pPr lvl="4"/>
             <a:r>
-              <a:rPr lang="en-US" smtClean="0"/>
+              <a:rPr lang="en-US"/>
               <a:t>Fifth level</a:t>
             </a:r>
             <a:endParaRPr lang="en-IN"/>
@@ -809,7 +825,7 @@
           <a:p>
             <a:fld id="{6EABF89B-1986-42A1-A443-E65C3BB5A974}" type="datetime4">
               <a:rPr lang="en-IN" smtClean="0"/>
-              <a:t>27 January 2016</a:t>
+              <a:t>09 June 2021</a:t>
             </a:fld>
             <a:endParaRPr lang="en-IN"/>
           </a:p>
@@ -903,7 +919,7 @@
           <a:lstStyle/>
           <a:p>
             <a:r>
-              <a:rPr lang="en-US" smtClean="0"/>
+              <a:rPr lang="en-US"/>
               <a:t>Click to edit Master title style</a:t>
             </a:r>
             <a:endParaRPr lang="en-IN"/>
@@ -932,35 +948,35 @@
           <a:p>
             <a:pPr lvl="0"/>
             <a:r>
-              <a:rPr lang="en-US" smtClean="0"/>
+              <a:rPr lang="en-US"/>
               <a:t>Click to edit Master text styles</a:t>
             </a:r>
           </a:p>
           <a:p>
             <a:pPr lvl="1"/>
             <a:r>
-              <a:rPr lang="en-US" smtClean="0"/>
+              <a:rPr lang="en-US"/>
               <a:t>Second level</a:t>
             </a:r>
           </a:p>
           <a:p>
             <a:pPr lvl="2"/>
             <a:r>
-              <a:rPr lang="en-US" smtClean="0"/>
+              <a:rPr lang="en-US"/>
               <a:t>Third level</a:t>
             </a:r>
           </a:p>
           <a:p>
             <a:pPr lvl="3"/>
             <a:r>
-              <a:rPr lang="en-US" smtClean="0"/>
+              <a:rPr lang="en-US"/>
               <a:t>Fourth level</a:t>
             </a:r>
           </a:p>
           <a:p>
             <a:pPr lvl="4"/>
             <a:r>
-              <a:rPr lang="en-US" smtClean="0"/>
+              <a:rPr lang="en-US"/>
               <a:t>Fifth level</a:t>
             </a:r>
             <a:endParaRPr lang="en-IN"/>
@@ -984,7 +1000,7 @@
           <a:p>
             <a:fld id="{95082EA7-CF00-425D-A785-BEE1492EBC19}" type="datetime4">
               <a:rPr lang="en-IN" smtClean="0"/>
-              <a:t>27 January 2016</a:t>
+              <a:t>09 June 2021</a:t>
             </a:fld>
             <a:endParaRPr lang="en-IN"/>
           </a:p>
@@ -1073,7 +1089,7 @@
           <a:lstStyle/>
           <a:p>
             <a:r>
-              <a:rPr lang="en-US" smtClean="0"/>
+              <a:rPr lang="en-US"/>
               <a:t>Click to edit Master title style</a:t>
             </a:r>
             <a:endParaRPr lang="en-IN"/>
@@ -1097,35 +1113,35 @@
           <a:p>
             <a:pPr lvl="0"/>
             <a:r>
-              <a:rPr lang="en-US" smtClean="0"/>
+              <a:rPr lang="en-US"/>
               <a:t>Click to edit Master text styles</a:t>
             </a:r>
           </a:p>
           <a:p>
             <a:pPr lvl="1"/>
             <a:r>
-              <a:rPr lang="en-US" smtClean="0"/>
+              <a:rPr lang="en-US"/>
               <a:t>Second level</a:t>
             </a:r>
           </a:p>
           <a:p>
             <a:pPr lvl="2"/>
             <a:r>
-              <a:rPr lang="en-US" smtClean="0"/>
+              <a:rPr lang="en-US"/>
               <a:t>Third level</a:t>
             </a:r>
           </a:p>
           <a:p>
             <a:pPr lvl="3"/>
             <a:r>
-              <a:rPr lang="en-US" smtClean="0"/>
+              <a:rPr lang="en-US"/>
               <a:t>Fourth level</a:t>
             </a:r>
           </a:p>
           <a:p>
             <a:pPr lvl="4"/>
             <a:r>
-              <a:rPr lang="en-US" smtClean="0"/>
+              <a:rPr lang="en-US"/>
               <a:t>Fifth level</a:t>
             </a:r>
             <a:endParaRPr lang="en-IN"/>
@@ -1149,7 +1165,7 @@
           <a:p>
             <a:fld id="{A3CE591C-F2AE-4A99-929C-81B4BA8FF67E}" type="datetime4">
               <a:rPr lang="en-IN" smtClean="0"/>
-              <a:t>27 January 2016</a:t>
+              <a:t>09 June 2021</a:t>
             </a:fld>
             <a:endParaRPr lang="en-IN"/>
           </a:p>
@@ -1247,7 +1263,7 @@
           </a:lstStyle>
           <a:p>
             <a:r>
-              <a:rPr lang="en-US" smtClean="0"/>
+              <a:rPr lang="en-US"/>
               <a:t>Click to edit Master title style</a:t>
             </a:r>
             <a:endParaRPr lang="en-IN"/>
@@ -1367,7 +1383,7 @@
           <a:p>
             <a:pPr lvl="0"/>
             <a:r>
-              <a:rPr lang="en-US" smtClean="0"/>
+              <a:rPr lang="en-US"/>
               <a:t>Click to edit Master text styles</a:t>
             </a:r>
           </a:p>
@@ -1390,7 +1406,7 @@
           <a:p>
             <a:fld id="{F86C5339-AD76-4734-9F5A-207BF5C7804B}" type="datetime4">
               <a:rPr lang="en-IN" smtClean="0"/>
-              <a:t>27 January 2016</a:t>
+              <a:t>09 June 2021</a:t>
             </a:fld>
             <a:endParaRPr lang="en-IN"/>
           </a:p>
@@ -1479,7 +1495,7 @@
           <a:lstStyle/>
           <a:p>
             <a:r>
-              <a:rPr lang="en-US" smtClean="0"/>
+              <a:rPr lang="en-US"/>
               <a:t>Click to edit Master title style</a:t>
             </a:r>
             <a:endParaRPr lang="en-IN"/>
@@ -1536,35 +1552,35 @@
           <a:p>
             <a:pPr lvl="0"/>
             <a:r>
-              <a:rPr lang="en-US" smtClean="0"/>
+              <a:rPr lang="en-US"/>
               <a:t>Click to edit Master text styles</a:t>
             </a:r>
           </a:p>
           <a:p>
             <a:pPr lvl="1"/>
             <a:r>
-              <a:rPr lang="en-US" smtClean="0"/>
+              <a:rPr lang="en-US"/>
               <a:t>Second level</a:t>
             </a:r>
           </a:p>
           <a:p>
             <a:pPr lvl="2"/>
             <a:r>
-              <a:rPr lang="en-US" smtClean="0"/>
+              <a:rPr lang="en-US"/>
               <a:t>Third level</a:t>
             </a:r>
           </a:p>
           <a:p>
             <a:pPr lvl="3"/>
             <a:r>
-              <a:rPr lang="en-US" smtClean="0"/>
+              <a:rPr lang="en-US"/>
               <a:t>Fourth level</a:t>
             </a:r>
           </a:p>
           <a:p>
             <a:pPr lvl="4"/>
             <a:r>
-              <a:rPr lang="en-US" smtClean="0"/>
+              <a:rPr lang="en-US"/>
               <a:t>Fifth level</a:t>
             </a:r>
             <a:endParaRPr lang="en-IN"/>
@@ -1621,35 +1637,35 @@
           <a:p>
             <a:pPr lvl="0"/>
             <a:r>
-              <a:rPr lang="en-US" smtClean="0"/>
+              <a:rPr lang="en-US"/>
               <a:t>Click to edit Master text styles</a:t>
             </a:r>
           </a:p>
           <a:p>
             <a:pPr lvl="1"/>
             <a:r>
-              <a:rPr lang="en-US" smtClean="0"/>
+              <a:rPr lang="en-US"/>
               <a:t>Second level</a:t>
             </a:r>
           </a:p>
           <a:p>
             <a:pPr lvl="2"/>
             <a:r>
-              <a:rPr lang="en-US" smtClean="0"/>
+              <a:rPr lang="en-US"/>
               <a:t>Third level</a:t>
             </a:r>
           </a:p>
           <a:p>
             <a:pPr lvl="3"/>
             <a:r>
-              <a:rPr lang="en-US" smtClean="0"/>
+              <a:rPr lang="en-US"/>
               <a:t>Fourth level</a:t>
             </a:r>
           </a:p>
           <a:p>
             <a:pPr lvl="4"/>
             <a:r>
-              <a:rPr lang="en-US" smtClean="0"/>
+              <a:rPr lang="en-US"/>
               <a:t>Fifth level</a:t>
             </a:r>
             <a:endParaRPr lang="en-IN"/>
@@ -1673,7 +1689,7 @@
           <a:p>
             <a:fld id="{D3BF498F-A914-403B-9F2B-154CBF7F4BD6}" type="datetime4">
               <a:rPr lang="en-IN" smtClean="0"/>
-              <a:t>27 January 2016</a:t>
+              <a:t>09 June 2021</a:t>
             </a:fld>
             <a:endParaRPr lang="en-IN"/>
           </a:p>
@@ -1766,7 +1782,7 @@
           </a:lstStyle>
           <a:p>
             <a:r>
-              <a:rPr lang="en-US" smtClean="0"/>
+              <a:rPr lang="en-US"/>
               <a:t>Click to edit Master title style</a:t>
             </a:r>
             <a:endParaRPr lang="en-IN"/>
@@ -1832,7 +1848,7 @@
           <a:p>
             <a:pPr lvl="0"/>
             <a:r>
-              <a:rPr lang="en-US" smtClean="0"/>
+              <a:rPr lang="en-US"/>
               <a:t>Click to edit Master text styles</a:t>
             </a:r>
           </a:p>
@@ -1888,35 +1904,35 @@
           <a:p>
             <a:pPr lvl="0"/>
             <a:r>
-              <a:rPr lang="en-US" smtClean="0"/>
+              <a:rPr lang="en-US"/>
               <a:t>Click to edit Master text styles</a:t>
             </a:r>
           </a:p>
           <a:p>
             <a:pPr lvl="1"/>
             <a:r>
-              <a:rPr lang="en-US" smtClean="0"/>
+              <a:rPr lang="en-US"/>
               <a:t>Second level</a:t>
             </a:r>
           </a:p>
           <a:p>
             <a:pPr lvl="2"/>
             <a:r>
-              <a:rPr lang="en-US" smtClean="0"/>
+              <a:rPr lang="en-US"/>
               <a:t>Third level</a:t>
             </a:r>
           </a:p>
           <a:p>
             <a:pPr lvl="3"/>
             <a:r>
-              <a:rPr lang="en-US" smtClean="0"/>
+              <a:rPr lang="en-US"/>
               <a:t>Fourth level</a:t>
             </a:r>
           </a:p>
           <a:p>
             <a:pPr lvl="4"/>
             <a:r>
-              <a:rPr lang="en-US" smtClean="0"/>
+              <a:rPr lang="en-US"/>
               <a:t>Fifth level</a:t>
             </a:r>
             <a:endParaRPr lang="en-IN"/>
@@ -1982,7 +1998,7 @@
           <a:p>
             <a:pPr lvl="0"/>
             <a:r>
-              <a:rPr lang="en-US" smtClean="0"/>
+              <a:rPr lang="en-US"/>
               <a:t>Click to edit Master text styles</a:t>
             </a:r>
           </a:p>
@@ -2038,35 +2054,35 @@
           <a:p>
             <a:pPr lvl="0"/>
             <a:r>
-              <a:rPr lang="en-US" smtClean="0"/>
+              <a:rPr lang="en-US"/>
               <a:t>Click to edit Master text styles</a:t>
             </a:r>
           </a:p>
           <a:p>
             <a:pPr lvl="1"/>
             <a:r>
-              <a:rPr lang="en-US" smtClean="0"/>
+              <a:rPr lang="en-US"/>
               <a:t>Second level</a:t>
             </a:r>
           </a:p>
           <a:p>
             <a:pPr lvl="2"/>
             <a:r>
-              <a:rPr lang="en-US" smtClean="0"/>
+              <a:rPr lang="en-US"/>
               <a:t>Third level</a:t>
             </a:r>
           </a:p>
           <a:p>
             <a:pPr lvl="3"/>
             <a:r>
-              <a:rPr lang="en-US" smtClean="0"/>
+              <a:rPr lang="en-US"/>
               <a:t>Fourth level</a:t>
             </a:r>
           </a:p>
           <a:p>
             <a:pPr lvl="4"/>
             <a:r>
-              <a:rPr lang="en-US" smtClean="0"/>
+              <a:rPr lang="en-US"/>
               <a:t>Fifth level</a:t>
             </a:r>
             <a:endParaRPr lang="en-IN"/>
@@ -2090,7 +2106,7 @@
           <a:p>
             <a:fld id="{0FA64DB0-35D1-47DE-A966-FB342CE5D43F}" type="datetime4">
               <a:rPr lang="en-IN" smtClean="0"/>
-              <a:t>27 January 2016</a:t>
+              <a:t>09 June 2021</a:t>
             </a:fld>
             <a:endParaRPr lang="en-IN"/>
           </a:p>
@@ -2179,7 +2195,7 @@
           <a:lstStyle/>
           <a:p>
             <a:r>
-              <a:rPr lang="en-US" smtClean="0"/>
+              <a:rPr lang="en-US"/>
               <a:t>Click to edit Master title style</a:t>
             </a:r>
             <a:endParaRPr lang="en-IN"/>
@@ -2203,7 +2219,7 @@
           <a:p>
             <a:fld id="{050A7ECC-F572-4B7D-B55D-FDBCDF289DD7}" type="datetime4">
               <a:rPr lang="en-IN" smtClean="0"/>
-              <a:t>27 January 2016</a:t>
+              <a:t>09 June 2021</a:t>
             </a:fld>
             <a:endParaRPr lang="en-IN"/>
           </a:p>
@@ -2293,7 +2309,7 @@
           <a:p>
             <a:fld id="{C672AD80-6BC8-4A11-8DC3-D28B0725072C}" type="datetime4">
               <a:rPr lang="en-IN" smtClean="0"/>
-              <a:t>27 January 2016</a:t>
+              <a:t>09 June 2021</a:t>
             </a:fld>
             <a:endParaRPr lang="en-IN"/>
           </a:p>
@@ -2391,7 +2407,7 @@
           </a:lstStyle>
           <a:p>
             <a:r>
-              <a:rPr lang="en-US" smtClean="0"/>
+              <a:rPr lang="en-US"/>
               <a:t>Click to edit Master title style</a:t>
             </a:r>
             <a:endParaRPr lang="en-IN"/>
@@ -2448,35 +2464,35 @@
           <a:p>
             <a:pPr lvl="0"/>
             <a:r>
-              <a:rPr lang="en-US" smtClean="0"/>
+              <a:rPr lang="en-US"/>
               <a:t>Click to edit Master text styles</a:t>
             </a:r>
           </a:p>
           <a:p>
             <a:pPr lvl="1"/>
             <a:r>
-              <a:rPr lang="en-US" smtClean="0"/>
+              <a:rPr lang="en-US"/>
               <a:t>Second level</a:t>
             </a:r>
           </a:p>
           <a:p>
             <a:pPr lvl="2"/>
             <a:r>
-              <a:rPr lang="en-US" smtClean="0"/>
+              <a:rPr lang="en-US"/>
               <a:t>Third level</a:t>
             </a:r>
           </a:p>
           <a:p>
             <a:pPr lvl="3"/>
             <a:r>
-              <a:rPr lang="en-US" smtClean="0"/>
+              <a:rPr lang="en-US"/>
               <a:t>Fourth level</a:t>
             </a:r>
           </a:p>
           <a:p>
             <a:pPr lvl="4"/>
             <a:r>
-              <a:rPr lang="en-US" smtClean="0"/>
+              <a:rPr lang="en-US"/>
               <a:t>Fifth level</a:t>
             </a:r>
             <a:endParaRPr lang="en-IN"/>
@@ -2542,7 +2558,7 @@
           <a:p>
             <a:pPr lvl="0"/>
             <a:r>
-              <a:rPr lang="en-US" smtClean="0"/>
+              <a:rPr lang="en-US"/>
               <a:t>Click to edit Master text styles</a:t>
             </a:r>
           </a:p>
@@ -2565,7 +2581,7 @@
           <a:p>
             <a:fld id="{5049F6D9-A4E1-4F49-9147-7DFF8F63790F}" type="datetime4">
               <a:rPr lang="en-IN" smtClean="0"/>
-              <a:t>27 January 2016</a:t>
+              <a:t>09 June 2021</a:t>
             </a:fld>
             <a:endParaRPr lang="en-IN"/>
           </a:p>
@@ -2663,7 +2679,7 @@
           </a:lstStyle>
           <a:p>
             <a:r>
-              <a:rPr lang="en-US" smtClean="0"/>
+              <a:rPr lang="en-US"/>
               <a:t>Click to edit Master title style</a:t>
             </a:r>
             <a:endParaRPr lang="en-IN"/>
@@ -2790,7 +2806,7 @@
           <a:p>
             <a:pPr lvl="0"/>
             <a:r>
-              <a:rPr lang="en-US" smtClean="0"/>
+              <a:rPr lang="en-US"/>
               <a:t>Click to edit Master text styles</a:t>
             </a:r>
           </a:p>
@@ -2813,7 +2829,7 @@
           <a:p>
             <a:fld id="{9309A248-4888-4712-98BA-AB7B91A5E8A7}" type="datetime4">
               <a:rPr lang="en-IN" smtClean="0"/>
-              <a:t>27 January 2016</a:t>
+              <a:t>09 June 2021</a:t>
             </a:fld>
             <a:endParaRPr lang="en-IN"/>
           </a:p>
@@ -2917,7 +2933,7 @@
           <a:lstStyle/>
           <a:p>
             <a:r>
-              <a:rPr lang="en-US" smtClean="0"/>
+              <a:rPr lang="en-US"/>
               <a:t>Click to edit Master title style</a:t>
             </a:r>
             <a:endParaRPr lang="en-IN"/>
@@ -2951,35 +2967,35 @@
           <a:p>
             <a:pPr lvl="0"/>
             <a:r>
-              <a:rPr lang="en-US" smtClean="0"/>
+              <a:rPr lang="en-US"/>
               <a:t>Click to edit Master text styles</a:t>
             </a:r>
           </a:p>
           <a:p>
             <a:pPr lvl="1"/>
             <a:r>
-              <a:rPr lang="en-US" smtClean="0"/>
+              <a:rPr lang="en-US"/>
               <a:t>Second level</a:t>
             </a:r>
           </a:p>
           <a:p>
             <a:pPr lvl="2"/>
             <a:r>
-              <a:rPr lang="en-US" smtClean="0"/>
+              <a:rPr lang="en-US"/>
               <a:t>Third level</a:t>
             </a:r>
           </a:p>
           <a:p>
             <a:pPr lvl="3"/>
             <a:r>
-              <a:rPr lang="en-US" smtClean="0"/>
+              <a:rPr lang="en-US"/>
               <a:t>Fourth level</a:t>
             </a:r>
           </a:p>
           <a:p>
             <a:pPr lvl="4"/>
             <a:r>
-              <a:rPr lang="en-US" smtClean="0"/>
+              <a:rPr lang="en-US"/>
               <a:t>Fifth level</a:t>
             </a:r>
             <a:endParaRPr lang="en-IN"/>
@@ -3021,7 +3037,7 @@
           <a:p>
             <a:fld id="{08F81F5D-EB0B-4B3A-9297-3DB9A8902B6D}" type="datetime4">
               <a:rPr lang="en-IN" smtClean="0"/>
-              <a:t>27 January 2016</a:t>
+              <a:t>09 June 2021</a:t>
             </a:fld>
             <a:endParaRPr lang="en-IN"/>
           </a:p>
@@ -3394,24 +3410,133 @@
       </p:grpSpPr>
       <p:sp>
         <p:nvSpPr>
-          <p:cNvPr id="4" name="Date Placeholder 3"/>
-          <p:cNvSpPr>
-            <a:spLocks noGrp="1"/>
-          </p:cNvSpPr>
-          <p:nvPr>
-            <p:ph type="dt" sz="half" idx="10"/>
-          </p:nvPr>
-        </p:nvSpPr>
-        <p:spPr/>
-        <p:txBody>
-          <a:bodyPr/>
-          <a:lstStyle/>
+          <p:cNvPr id="3" name="Date Placeholder 3">
+            <a:extLst>
+              <a:ext uri="{FF2B5EF4-FFF2-40B4-BE49-F238E27FC236}">
+                <a16:creationId xmlns:a16="http://schemas.microsoft.com/office/drawing/2014/main" id="{5D32C4C1-B04E-44AE-BD3A-F8103B37EDF5}"/>
+              </a:ext>
+            </a:extLst>
+          </p:cNvPr>
+          <p:cNvSpPr txBox="1">
+            <a:spLocks/>
+          </p:cNvSpPr>
+          <p:nvPr/>
+        </p:nvSpPr>
+        <p:spPr>
+          <a:xfrm>
+            <a:off x="491412" y="5991225"/>
+            <a:ext cx="2133600" cy="365125"/>
+          </a:xfrm>
+          <a:prstGeom prst="rect">
+            <a:avLst/>
+          </a:prstGeom>
+        </p:spPr>
+        <p:txBody>
+          <a:bodyPr vert="horz" lIns="91440" tIns="45720" rIns="91440" bIns="45720" rtlCol="0" anchor="ctr"/>
+          <a:lstStyle>
+            <a:defPPr>
+              <a:defRPr lang="en-US"/>
+            </a:defPPr>
+            <a:lvl1pPr marL="0" algn="l" defTabSz="914400" rtl="0" eaLnBrk="1" latinLnBrk="0" hangingPunct="1">
+              <a:defRPr sz="1200" kern="1200">
+                <a:solidFill>
+                  <a:schemeClr val="tx1">
+                    <a:tint val="75000"/>
+                  </a:schemeClr>
+                </a:solidFill>
+                <a:latin typeface="+mn-lt"/>
+                <a:ea typeface="+mn-ea"/>
+                <a:cs typeface="+mn-cs"/>
+              </a:defRPr>
+            </a:lvl1pPr>
+            <a:lvl2pPr marL="457200" algn="l" defTabSz="914400" rtl="0" eaLnBrk="1" latinLnBrk="0" hangingPunct="1">
+              <a:defRPr sz="1800" kern="1200">
+                <a:solidFill>
+                  <a:schemeClr val="tx1"/>
+                </a:solidFill>
+                <a:latin typeface="+mn-lt"/>
+                <a:ea typeface="+mn-ea"/>
+                <a:cs typeface="+mn-cs"/>
+              </a:defRPr>
+            </a:lvl2pPr>
+            <a:lvl3pPr marL="914400" algn="l" defTabSz="914400" rtl="0" eaLnBrk="1" latinLnBrk="0" hangingPunct="1">
+              <a:defRPr sz="1800" kern="1200">
+                <a:solidFill>
+                  <a:schemeClr val="tx1"/>
+                </a:solidFill>
+                <a:latin typeface="+mn-lt"/>
+                <a:ea typeface="+mn-ea"/>
+                <a:cs typeface="+mn-cs"/>
+              </a:defRPr>
+            </a:lvl3pPr>
+            <a:lvl4pPr marL="1371600" algn="l" defTabSz="914400" rtl="0" eaLnBrk="1" latinLnBrk="0" hangingPunct="1">
+              <a:defRPr sz="1800" kern="1200">
+                <a:solidFill>
+                  <a:schemeClr val="tx1"/>
+                </a:solidFill>
+                <a:latin typeface="+mn-lt"/>
+                <a:ea typeface="+mn-ea"/>
+                <a:cs typeface="+mn-cs"/>
+              </a:defRPr>
+            </a:lvl4pPr>
+            <a:lvl5pPr marL="1828800" algn="l" defTabSz="914400" rtl="0" eaLnBrk="1" latinLnBrk="0" hangingPunct="1">
+              <a:defRPr sz="1800" kern="1200">
+                <a:solidFill>
+                  <a:schemeClr val="tx1"/>
+                </a:solidFill>
+                <a:latin typeface="+mn-lt"/>
+                <a:ea typeface="+mn-ea"/>
+                <a:cs typeface="+mn-cs"/>
+              </a:defRPr>
+            </a:lvl5pPr>
+            <a:lvl6pPr marL="2286000" algn="l" defTabSz="914400" rtl="0" eaLnBrk="1" latinLnBrk="0" hangingPunct="1">
+              <a:defRPr sz="1800" kern="1200">
+                <a:solidFill>
+                  <a:schemeClr val="tx1"/>
+                </a:solidFill>
+                <a:latin typeface="+mn-lt"/>
+                <a:ea typeface="+mn-ea"/>
+                <a:cs typeface="+mn-cs"/>
+              </a:defRPr>
+            </a:lvl6pPr>
+            <a:lvl7pPr marL="2743200" algn="l" defTabSz="914400" rtl="0" eaLnBrk="1" latinLnBrk="0" hangingPunct="1">
+              <a:defRPr sz="1800" kern="1200">
+                <a:solidFill>
+                  <a:schemeClr val="tx1"/>
+                </a:solidFill>
+                <a:latin typeface="+mn-lt"/>
+                <a:ea typeface="+mn-ea"/>
+                <a:cs typeface="+mn-cs"/>
+              </a:defRPr>
+            </a:lvl7pPr>
+            <a:lvl8pPr marL="3200400" algn="l" defTabSz="914400" rtl="0" eaLnBrk="1" latinLnBrk="0" hangingPunct="1">
+              <a:defRPr sz="1800" kern="1200">
+                <a:solidFill>
+                  <a:schemeClr val="tx1"/>
+                </a:solidFill>
+                <a:latin typeface="+mn-lt"/>
+                <a:ea typeface="+mn-ea"/>
+                <a:cs typeface="+mn-cs"/>
+              </a:defRPr>
+            </a:lvl8pPr>
+            <a:lvl9pPr marL="3657600" algn="l" defTabSz="914400" rtl="0" eaLnBrk="1" latinLnBrk="0" hangingPunct="1">
+              <a:defRPr sz="1800" kern="1200">
+                <a:solidFill>
+                  <a:schemeClr val="tx1"/>
+                </a:solidFill>
+                <a:latin typeface="+mn-lt"/>
+                <a:ea typeface="+mn-ea"/>
+                <a:cs typeface="+mn-cs"/>
+              </a:defRPr>
+            </a:lvl9pPr>
+          </a:lstStyle>
           <a:p>
             <a:fld id="{6F1FB038-ACEC-47F0-9348-1F0FFA4AC8CD}" type="datetime4">
               <a:rPr lang="en-IN" smtClean="0"/>
-              <a:t>27 January 2016</a:t>
+              <a:pPr/>
+              <a:t>09 June 2021</a:t>
             </a:fld>
-            <a:endParaRPr lang="en-IN"/>
+            <a:endParaRPr lang="en-IN" dirty="0"/>
           </a:p>
         </p:txBody>
       </p:sp>
@@ -3442,22 +3567,131 @@
       </p:grpSpPr>
       <p:sp>
         <p:nvSpPr>
-          <p:cNvPr id="4" name="Date Placeholder 3"/>
-          <p:cNvSpPr>
-            <a:spLocks noGrp="1"/>
-          </p:cNvSpPr>
-          <p:nvPr>
-            <p:ph type="dt" sz="half" idx="10"/>
-          </p:nvPr>
-        </p:nvSpPr>
-        <p:spPr/>
-        <p:txBody>
-          <a:bodyPr/>
-          <a:lstStyle/>
+          <p:cNvPr id="3" name="Date Placeholder 3">
+            <a:extLst>
+              <a:ext uri="{FF2B5EF4-FFF2-40B4-BE49-F238E27FC236}">
+                <a16:creationId xmlns:a16="http://schemas.microsoft.com/office/drawing/2014/main" id="{7A5DEDD5-8799-412C-A85F-A8DEF7B459A0}"/>
+              </a:ext>
+            </a:extLst>
+          </p:cNvPr>
+          <p:cNvSpPr txBox="1">
+            <a:spLocks/>
+          </p:cNvSpPr>
+          <p:nvPr/>
+        </p:nvSpPr>
+        <p:spPr>
+          <a:xfrm>
+            <a:off x="457200" y="5991225"/>
+            <a:ext cx="2133600" cy="365125"/>
+          </a:xfrm>
+          <a:prstGeom prst="rect">
+            <a:avLst/>
+          </a:prstGeom>
+        </p:spPr>
+        <p:txBody>
+          <a:bodyPr vert="horz" lIns="91440" tIns="45720" rIns="91440" bIns="45720" rtlCol="0" anchor="ctr"/>
+          <a:lstStyle>
+            <a:defPPr>
+              <a:defRPr lang="en-US"/>
+            </a:defPPr>
+            <a:lvl1pPr marL="0" algn="l" defTabSz="914400" rtl="0" eaLnBrk="1" latinLnBrk="0" hangingPunct="1">
+              <a:defRPr sz="1200" kern="1200">
+                <a:solidFill>
+                  <a:schemeClr val="tx1">
+                    <a:tint val="75000"/>
+                  </a:schemeClr>
+                </a:solidFill>
+                <a:latin typeface="+mn-lt"/>
+                <a:ea typeface="+mn-ea"/>
+                <a:cs typeface="+mn-cs"/>
+              </a:defRPr>
+            </a:lvl1pPr>
+            <a:lvl2pPr marL="457200" algn="l" defTabSz="914400" rtl="0" eaLnBrk="1" latinLnBrk="0" hangingPunct="1">
+              <a:defRPr sz="1800" kern="1200">
+                <a:solidFill>
+                  <a:schemeClr val="tx1"/>
+                </a:solidFill>
+                <a:latin typeface="+mn-lt"/>
+                <a:ea typeface="+mn-ea"/>
+                <a:cs typeface="+mn-cs"/>
+              </a:defRPr>
+            </a:lvl2pPr>
+            <a:lvl3pPr marL="914400" algn="l" defTabSz="914400" rtl="0" eaLnBrk="1" latinLnBrk="0" hangingPunct="1">
+              <a:defRPr sz="1800" kern="1200">
+                <a:solidFill>
+                  <a:schemeClr val="tx1"/>
+                </a:solidFill>
+                <a:latin typeface="+mn-lt"/>
+                <a:ea typeface="+mn-ea"/>
+                <a:cs typeface="+mn-cs"/>
+              </a:defRPr>
+            </a:lvl3pPr>
+            <a:lvl4pPr marL="1371600" algn="l" defTabSz="914400" rtl="0" eaLnBrk="1" latinLnBrk="0" hangingPunct="1">
+              <a:defRPr sz="1800" kern="1200">
+                <a:solidFill>
+                  <a:schemeClr val="tx1"/>
+                </a:solidFill>
+                <a:latin typeface="+mn-lt"/>
+                <a:ea typeface="+mn-ea"/>
+                <a:cs typeface="+mn-cs"/>
+              </a:defRPr>
+            </a:lvl4pPr>
+            <a:lvl5pPr marL="1828800" algn="l" defTabSz="914400" rtl="0" eaLnBrk="1" latinLnBrk="0" hangingPunct="1">
+              <a:defRPr sz="1800" kern="1200">
+                <a:solidFill>
+                  <a:schemeClr val="tx1"/>
+                </a:solidFill>
+                <a:latin typeface="+mn-lt"/>
+                <a:ea typeface="+mn-ea"/>
+                <a:cs typeface="+mn-cs"/>
+              </a:defRPr>
+            </a:lvl5pPr>
+            <a:lvl6pPr marL="2286000" algn="l" defTabSz="914400" rtl="0" eaLnBrk="1" latinLnBrk="0" hangingPunct="1">
+              <a:defRPr sz="1800" kern="1200">
+                <a:solidFill>
+                  <a:schemeClr val="tx1"/>
+                </a:solidFill>
+                <a:latin typeface="+mn-lt"/>
+                <a:ea typeface="+mn-ea"/>
+                <a:cs typeface="+mn-cs"/>
+              </a:defRPr>
+            </a:lvl6pPr>
+            <a:lvl7pPr marL="2743200" algn="l" defTabSz="914400" rtl="0" eaLnBrk="1" latinLnBrk="0" hangingPunct="1">
+              <a:defRPr sz="1800" kern="1200">
+                <a:solidFill>
+                  <a:schemeClr val="tx1"/>
+                </a:solidFill>
+                <a:latin typeface="+mn-lt"/>
+                <a:ea typeface="+mn-ea"/>
+                <a:cs typeface="+mn-cs"/>
+              </a:defRPr>
+            </a:lvl7pPr>
+            <a:lvl8pPr marL="3200400" algn="l" defTabSz="914400" rtl="0" eaLnBrk="1" latinLnBrk="0" hangingPunct="1">
+              <a:defRPr sz="1800" kern="1200">
+                <a:solidFill>
+                  <a:schemeClr val="tx1"/>
+                </a:solidFill>
+                <a:latin typeface="+mn-lt"/>
+                <a:ea typeface="+mn-ea"/>
+                <a:cs typeface="+mn-cs"/>
+              </a:defRPr>
+            </a:lvl8pPr>
+            <a:lvl9pPr marL="3657600" algn="l" defTabSz="914400" rtl="0" eaLnBrk="1" latinLnBrk="0" hangingPunct="1">
+              <a:defRPr sz="1800" kern="1200">
+                <a:solidFill>
+                  <a:schemeClr val="tx1"/>
+                </a:solidFill>
+                <a:latin typeface="+mn-lt"/>
+                <a:ea typeface="+mn-ea"/>
+                <a:cs typeface="+mn-cs"/>
+              </a:defRPr>
+            </a:lvl9pPr>
+          </a:lstStyle>
           <a:p>
             <a:fld id="{3D8552DC-8493-4C08-B339-F696EB9E8552}" type="datetime1">
               <a:rPr lang="en-IN" smtClean="0"/>
-              <a:t>27-01-2016</a:t>
+              <a:pPr/>
+              <a:t>09-06-2021</a:t>
             </a:fld>
             <a:endParaRPr lang="en-IN"/>
           </a:p>
@@ -3490,24 +3724,133 @@
       </p:grpSpPr>
       <p:sp>
         <p:nvSpPr>
-          <p:cNvPr id="4" name="Date Placeholder 3"/>
-          <p:cNvSpPr>
-            <a:spLocks noGrp="1"/>
-          </p:cNvSpPr>
-          <p:nvPr>
-            <p:ph type="dt" sz="half" idx="10"/>
-          </p:nvPr>
-        </p:nvSpPr>
-        <p:spPr/>
-        <p:txBody>
-          <a:bodyPr/>
-          <a:lstStyle/>
+          <p:cNvPr id="3" name="Date Placeholder 3">
+            <a:extLst>
+              <a:ext uri="{FF2B5EF4-FFF2-40B4-BE49-F238E27FC236}">
+                <a16:creationId xmlns:a16="http://schemas.microsoft.com/office/drawing/2014/main" id="{E0DB2DE7-E258-4FA3-888A-15E333C72B89}"/>
+              </a:ext>
+            </a:extLst>
+          </p:cNvPr>
+          <p:cNvSpPr txBox="1">
+            <a:spLocks/>
+          </p:cNvSpPr>
+          <p:nvPr/>
+        </p:nvSpPr>
+        <p:spPr>
+          <a:xfrm>
+            <a:off x="457200" y="5991225"/>
+            <a:ext cx="2133600" cy="365125"/>
+          </a:xfrm>
+          <a:prstGeom prst="rect">
+            <a:avLst/>
+          </a:prstGeom>
+        </p:spPr>
+        <p:txBody>
+          <a:bodyPr vert="horz" lIns="91440" tIns="45720" rIns="91440" bIns="45720" rtlCol="0" anchor="ctr"/>
+          <a:lstStyle>
+            <a:defPPr>
+              <a:defRPr lang="en-US"/>
+            </a:defPPr>
+            <a:lvl1pPr marL="0" algn="l" defTabSz="914400" rtl="0" eaLnBrk="1" latinLnBrk="0" hangingPunct="1">
+              <a:defRPr sz="1200" kern="1200">
+                <a:solidFill>
+                  <a:schemeClr val="tx1">
+                    <a:tint val="75000"/>
+                  </a:schemeClr>
+                </a:solidFill>
+                <a:latin typeface="+mn-lt"/>
+                <a:ea typeface="+mn-ea"/>
+                <a:cs typeface="+mn-cs"/>
+              </a:defRPr>
+            </a:lvl1pPr>
+            <a:lvl2pPr marL="457200" algn="l" defTabSz="914400" rtl="0" eaLnBrk="1" latinLnBrk="0" hangingPunct="1">
+              <a:defRPr sz="1800" kern="1200">
+                <a:solidFill>
+                  <a:schemeClr val="tx1"/>
+                </a:solidFill>
+                <a:latin typeface="+mn-lt"/>
+                <a:ea typeface="+mn-ea"/>
+                <a:cs typeface="+mn-cs"/>
+              </a:defRPr>
+            </a:lvl2pPr>
+            <a:lvl3pPr marL="914400" algn="l" defTabSz="914400" rtl="0" eaLnBrk="1" latinLnBrk="0" hangingPunct="1">
+              <a:defRPr sz="1800" kern="1200">
+                <a:solidFill>
+                  <a:schemeClr val="tx1"/>
+                </a:solidFill>
+                <a:latin typeface="+mn-lt"/>
+                <a:ea typeface="+mn-ea"/>
+                <a:cs typeface="+mn-cs"/>
+              </a:defRPr>
+            </a:lvl3pPr>
+            <a:lvl4pPr marL="1371600" algn="l" defTabSz="914400" rtl="0" eaLnBrk="1" latinLnBrk="0" hangingPunct="1">
+              <a:defRPr sz="1800" kern="1200">
+                <a:solidFill>
+                  <a:schemeClr val="tx1"/>
+                </a:solidFill>
+                <a:latin typeface="+mn-lt"/>
+                <a:ea typeface="+mn-ea"/>
+                <a:cs typeface="+mn-cs"/>
+              </a:defRPr>
+            </a:lvl4pPr>
+            <a:lvl5pPr marL="1828800" algn="l" defTabSz="914400" rtl="0" eaLnBrk="1" latinLnBrk="0" hangingPunct="1">
+              <a:defRPr sz="1800" kern="1200">
+                <a:solidFill>
+                  <a:schemeClr val="tx1"/>
+                </a:solidFill>
+                <a:latin typeface="+mn-lt"/>
+                <a:ea typeface="+mn-ea"/>
+                <a:cs typeface="+mn-cs"/>
+              </a:defRPr>
+            </a:lvl5pPr>
+            <a:lvl6pPr marL="2286000" algn="l" defTabSz="914400" rtl="0" eaLnBrk="1" latinLnBrk="0" hangingPunct="1">
+              <a:defRPr sz="1800" kern="1200">
+                <a:solidFill>
+                  <a:schemeClr val="tx1"/>
+                </a:solidFill>
+                <a:latin typeface="+mn-lt"/>
+                <a:ea typeface="+mn-ea"/>
+                <a:cs typeface="+mn-cs"/>
+              </a:defRPr>
+            </a:lvl6pPr>
+            <a:lvl7pPr marL="2743200" algn="l" defTabSz="914400" rtl="0" eaLnBrk="1" latinLnBrk="0" hangingPunct="1">
+              <a:defRPr sz="1800" kern="1200">
+                <a:solidFill>
+                  <a:schemeClr val="tx1"/>
+                </a:solidFill>
+                <a:latin typeface="+mn-lt"/>
+                <a:ea typeface="+mn-ea"/>
+                <a:cs typeface="+mn-cs"/>
+              </a:defRPr>
+            </a:lvl7pPr>
+            <a:lvl8pPr marL="3200400" algn="l" defTabSz="914400" rtl="0" eaLnBrk="1" latinLnBrk="0" hangingPunct="1">
+              <a:defRPr sz="1800" kern="1200">
+                <a:solidFill>
+                  <a:schemeClr val="tx1"/>
+                </a:solidFill>
+                <a:latin typeface="+mn-lt"/>
+                <a:ea typeface="+mn-ea"/>
+                <a:cs typeface="+mn-cs"/>
+              </a:defRPr>
+            </a:lvl8pPr>
+            <a:lvl9pPr marL="3657600" algn="l" defTabSz="914400" rtl="0" eaLnBrk="1" latinLnBrk="0" hangingPunct="1">
+              <a:defRPr sz="1800" kern="1200">
+                <a:solidFill>
+                  <a:schemeClr val="tx1"/>
+                </a:solidFill>
+                <a:latin typeface="+mn-lt"/>
+                <a:ea typeface="+mn-ea"/>
+                <a:cs typeface="+mn-cs"/>
+              </a:defRPr>
+            </a:lvl9pPr>
+          </a:lstStyle>
           <a:p>
             <a:fld id="{310BA1B9-101E-4D36-903A-746CAFB854A5}" type="datetime3">
               <a:rPr lang="en-IN" smtClean="0"/>
-              <a:t>27 January 2016</a:t>
+              <a:pPr/>
+              <a:t>9 June 2021</a:t>
             </a:fld>
-            <a:endParaRPr lang="en-IN"/>
+            <a:endParaRPr lang="en-IN" dirty="0"/>
           </a:p>
         </p:txBody>
       </p:sp>
@@ -3538,24 +3881,133 @@
       </p:grpSpPr>
       <p:sp>
         <p:nvSpPr>
-          <p:cNvPr id="4" name="Date Placeholder 3"/>
-          <p:cNvSpPr>
-            <a:spLocks noGrp="1"/>
-          </p:cNvSpPr>
-          <p:nvPr>
-            <p:ph type="dt" sz="half" idx="10"/>
-          </p:nvPr>
-        </p:nvSpPr>
-        <p:spPr/>
-        <p:txBody>
-          <a:bodyPr/>
-          <a:lstStyle/>
+          <p:cNvPr id="3" name="Date Placeholder 3">
+            <a:extLst>
+              <a:ext uri="{FF2B5EF4-FFF2-40B4-BE49-F238E27FC236}">
+                <a16:creationId xmlns:a16="http://schemas.microsoft.com/office/drawing/2014/main" id="{A9C82F76-7AF4-4198-BBAD-0198DCB4646A}"/>
+              </a:ext>
+            </a:extLst>
+          </p:cNvPr>
+          <p:cNvSpPr txBox="1">
+            <a:spLocks/>
+          </p:cNvSpPr>
+          <p:nvPr/>
+        </p:nvSpPr>
+        <p:spPr>
+          <a:xfrm>
+            <a:off x="457200" y="5991225"/>
+            <a:ext cx="2133600" cy="365125"/>
+          </a:xfrm>
+          <a:prstGeom prst="rect">
+            <a:avLst/>
+          </a:prstGeom>
+        </p:spPr>
+        <p:txBody>
+          <a:bodyPr vert="horz" lIns="91440" tIns="45720" rIns="91440" bIns="45720" rtlCol="0" anchor="ctr"/>
+          <a:lstStyle>
+            <a:defPPr>
+              <a:defRPr lang="en-US"/>
+            </a:defPPr>
+            <a:lvl1pPr marL="0" algn="l" defTabSz="914400" rtl="0" eaLnBrk="1" latinLnBrk="0" hangingPunct="1">
+              <a:defRPr sz="1200" kern="1200">
+                <a:solidFill>
+                  <a:schemeClr val="tx1">
+                    <a:tint val="75000"/>
+                  </a:schemeClr>
+                </a:solidFill>
+                <a:latin typeface="+mn-lt"/>
+                <a:ea typeface="+mn-ea"/>
+                <a:cs typeface="+mn-cs"/>
+              </a:defRPr>
+            </a:lvl1pPr>
+            <a:lvl2pPr marL="457200" algn="l" defTabSz="914400" rtl="0" eaLnBrk="1" latinLnBrk="0" hangingPunct="1">
+              <a:defRPr sz="1800" kern="1200">
+                <a:solidFill>
+                  <a:schemeClr val="tx1"/>
+                </a:solidFill>
+                <a:latin typeface="+mn-lt"/>
+                <a:ea typeface="+mn-ea"/>
+                <a:cs typeface="+mn-cs"/>
+              </a:defRPr>
+            </a:lvl2pPr>
+            <a:lvl3pPr marL="914400" algn="l" defTabSz="914400" rtl="0" eaLnBrk="1" latinLnBrk="0" hangingPunct="1">
+              <a:defRPr sz="1800" kern="1200">
+                <a:solidFill>
+                  <a:schemeClr val="tx1"/>
+                </a:solidFill>
+                <a:latin typeface="+mn-lt"/>
+                <a:ea typeface="+mn-ea"/>
+                <a:cs typeface="+mn-cs"/>
+              </a:defRPr>
+            </a:lvl3pPr>
+            <a:lvl4pPr marL="1371600" algn="l" defTabSz="914400" rtl="0" eaLnBrk="1" latinLnBrk="0" hangingPunct="1">
+              <a:defRPr sz="1800" kern="1200">
+                <a:solidFill>
+                  <a:schemeClr val="tx1"/>
+                </a:solidFill>
+                <a:latin typeface="+mn-lt"/>
+                <a:ea typeface="+mn-ea"/>
+                <a:cs typeface="+mn-cs"/>
+              </a:defRPr>
+            </a:lvl4pPr>
+            <a:lvl5pPr marL="1828800" algn="l" defTabSz="914400" rtl="0" eaLnBrk="1" latinLnBrk="0" hangingPunct="1">
+              <a:defRPr sz="1800" kern="1200">
+                <a:solidFill>
+                  <a:schemeClr val="tx1"/>
+                </a:solidFill>
+                <a:latin typeface="+mn-lt"/>
+                <a:ea typeface="+mn-ea"/>
+                <a:cs typeface="+mn-cs"/>
+              </a:defRPr>
+            </a:lvl5pPr>
+            <a:lvl6pPr marL="2286000" algn="l" defTabSz="914400" rtl="0" eaLnBrk="1" latinLnBrk="0" hangingPunct="1">
+              <a:defRPr sz="1800" kern="1200">
+                <a:solidFill>
+                  <a:schemeClr val="tx1"/>
+                </a:solidFill>
+                <a:latin typeface="+mn-lt"/>
+                <a:ea typeface="+mn-ea"/>
+                <a:cs typeface="+mn-cs"/>
+              </a:defRPr>
+            </a:lvl6pPr>
+            <a:lvl7pPr marL="2743200" algn="l" defTabSz="914400" rtl="0" eaLnBrk="1" latinLnBrk="0" hangingPunct="1">
+              <a:defRPr sz="1800" kern="1200">
+                <a:solidFill>
+                  <a:schemeClr val="tx1"/>
+                </a:solidFill>
+                <a:latin typeface="+mn-lt"/>
+                <a:ea typeface="+mn-ea"/>
+                <a:cs typeface="+mn-cs"/>
+              </a:defRPr>
+            </a:lvl7pPr>
+            <a:lvl8pPr marL="3200400" algn="l" defTabSz="914400" rtl="0" eaLnBrk="1" latinLnBrk="0" hangingPunct="1">
+              <a:defRPr sz="1800" kern="1200">
+                <a:solidFill>
+                  <a:schemeClr val="tx1"/>
+                </a:solidFill>
+                <a:latin typeface="+mn-lt"/>
+                <a:ea typeface="+mn-ea"/>
+                <a:cs typeface="+mn-cs"/>
+              </a:defRPr>
+            </a:lvl8pPr>
+            <a:lvl9pPr marL="3657600" algn="l" defTabSz="914400" rtl="0" eaLnBrk="1" latinLnBrk="0" hangingPunct="1">
+              <a:defRPr sz="1800" kern="1200">
+                <a:solidFill>
+                  <a:schemeClr val="tx1"/>
+                </a:solidFill>
+                <a:latin typeface="+mn-lt"/>
+                <a:ea typeface="+mn-ea"/>
+                <a:cs typeface="+mn-cs"/>
+              </a:defRPr>
+            </a:lvl9pPr>
+          </a:lstStyle>
           <a:p>
             <a:fld id="{AB4092FF-6B6F-4C9C-8873-EF1E09B49560}" type="datetime11">
               <a:rPr lang="en-IN" smtClean="0"/>
-              <a:t>14:02:41</a:t>
+              <a:pPr/>
+              <a:t>06:04:59</a:t>
             </a:fld>
-            <a:endParaRPr lang="en-IN"/>
+            <a:endParaRPr lang="en-IN" dirty="0"/>
           </a:p>
         </p:txBody>
       </p:sp>
@@ -3586,24 +4038,133 @@
       </p:grpSpPr>
       <p:sp>
         <p:nvSpPr>
-          <p:cNvPr id="4" name="Date Placeholder 3"/>
-          <p:cNvSpPr>
-            <a:spLocks noGrp="1"/>
-          </p:cNvSpPr>
-          <p:nvPr>
-            <p:ph type="dt" sz="half" idx="10"/>
-          </p:nvPr>
-        </p:nvSpPr>
-        <p:spPr/>
-        <p:txBody>
-          <a:bodyPr/>
-          <a:lstStyle/>
+          <p:cNvPr id="3" name="Date Placeholder 3">
+            <a:extLst>
+              <a:ext uri="{FF2B5EF4-FFF2-40B4-BE49-F238E27FC236}">
+                <a16:creationId xmlns:a16="http://schemas.microsoft.com/office/drawing/2014/main" id="{0259E4D7-0FB7-42D9-955E-2E5CB3A29496}"/>
+              </a:ext>
+            </a:extLst>
+          </p:cNvPr>
+          <p:cNvSpPr txBox="1">
+            <a:spLocks/>
+          </p:cNvSpPr>
+          <p:nvPr/>
+        </p:nvSpPr>
+        <p:spPr>
+          <a:xfrm>
+            <a:off x="457200" y="5994335"/>
+            <a:ext cx="2133600" cy="365125"/>
+          </a:xfrm>
+          <a:prstGeom prst="rect">
+            <a:avLst/>
+          </a:prstGeom>
+        </p:spPr>
+        <p:txBody>
+          <a:bodyPr vert="horz" lIns="91440" tIns="45720" rIns="91440" bIns="45720" rtlCol="0" anchor="ctr"/>
+          <a:lstStyle>
+            <a:defPPr>
+              <a:defRPr lang="en-US"/>
+            </a:defPPr>
+            <a:lvl1pPr marL="0" algn="l" defTabSz="914400" rtl="0" eaLnBrk="1" latinLnBrk="0" hangingPunct="1">
+              <a:defRPr sz="1200" kern="1200">
+                <a:solidFill>
+                  <a:schemeClr val="tx1">
+                    <a:tint val="75000"/>
+                  </a:schemeClr>
+                </a:solidFill>
+                <a:latin typeface="+mn-lt"/>
+                <a:ea typeface="+mn-ea"/>
+                <a:cs typeface="+mn-cs"/>
+              </a:defRPr>
+            </a:lvl1pPr>
+            <a:lvl2pPr marL="457200" algn="l" defTabSz="914400" rtl="0" eaLnBrk="1" latinLnBrk="0" hangingPunct="1">
+              <a:defRPr sz="1800" kern="1200">
+                <a:solidFill>
+                  <a:schemeClr val="tx1"/>
+                </a:solidFill>
+                <a:latin typeface="+mn-lt"/>
+                <a:ea typeface="+mn-ea"/>
+                <a:cs typeface="+mn-cs"/>
+              </a:defRPr>
+            </a:lvl2pPr>
+            <a:lvl3pPr marL="914400" algn="l" defTabSz="914400" rtl="0" eaLnBrk="1" latinLnBrk="0" hangingPunct="1">
+              <a:defRPr sz="1800" kern="1200">
+                <a:solidFill>
+                  <a:schemeClr val="tx1"/>
+                </a:solidFill>
+                <a:latin typeface="+mn-lt"/>
+                <a:ea typeface="+mn-ea"/>
+                <a:cs typeface="+mn-cs"/>
+              </a:defRPr>
+            </a:lvl3pPr>
+            <a:lvl4pPr marL="1371600" algn="l" defTabSz="914400" rtl="0" eaLnBrk="1" latinLnBrk="0" hangingPunct="1">
+              <a:defRPr sz="1800" kern="1200">
+                <a:solidFill>
+                  <a:schemeClr val="tx1"/>
+                </a:solidFill>
+                <a:latin typeface="+mn-lt"/>
+                <a:ea typeface="+mn-ea"/>
+                <a:cs typeface="+mn-cs"/>
+              </a:defRPr>
+            </a:lvl4pPr>
+            <a:lvl5pPr marL="1828800" algn="l" defTabSz="914400" rtl="0" eaLnBrk="1" latinLnBrk="0" hangingPunct="1">
+              <a:defRPr sz="1800" kern="1200">
+                <a:solidFill>
+                  <a:schemeClr val="tx1"/>
+                </a:solidFill>
+                <a:latin typeface="+mn-lt"/>
+                <a:ea typeface="+mn-ea"/>
+                <a:cs typeface="+mn-cs"/>
+              </a:defRPr>
+            </a:lvl5pPr>
+            <a:lvl6pPr marL="2286000" algn="l" defTabSz="914400" rtl="0" eaLnBrk="1" latinLnBrk="0" hangingPunct="1">
+              <a:defRPr sz="1800" kern="1200">
+                <a:solidFill>
+                  <a:schemeClr val="tx1"/>
+                </a:solidFill>
+                <a:latin typeface="+mn-lt"/>
+                <a:ea typeface="+mn-ea"/>
+                <a:cs typeface="+mn-cs"/>
+              </a:defRPr>
+            </a:lvl6pPr>
+            <a:lvl7pPr marL="2743200" algn="l" defTabSz="914400" rtl="0" eaLnBrk="1" latinLnBrk="0" hangingPunct="1">
+              <a:defRPr sz="1800" kern="1200">
+                <a:solidFill>
+                  <a:schemeClr val="tx1"/>
+                </a:solidFill>
+                <a:latin typeface="+mn-lt"/>
+                <a:ea typeface="+mn-ea"/>
+                <a:cs typeface="+mn-cs"/>
+              </a:defRPr>
+            </a:lvl7pPr>
+            <a:lvl8pPr marL="3200400" algn="l" defTabSz="914400" rtl="0" eaLnBrk="1" latinLnBrk="0" hangingPunct="1">
+              <a:defRPr sz="1800" kern="1200">
+                <a:solidFill>
+                  <a:schemeClr val="tx1"/>
+                </a:solidFill>
+                <a:latin typeface="+mn-lt"/>
+                <a:ea typeface="+mn-ea"/>
+                <a:cs typeface="+mn-cs"/>
+              </a:defRPr>
+            </a:lvl8pPr>
+            <a:lvl9pPr marL="3657600" algn="l" defTabSz="914400" rtl="0" eaLnBrk="1" latinLnBrk="0" hangingPunct="1">
+              <a:defRPr sz="1800" kern="1200">
+                <a:solidFill>
+                  <a:schemeClr val="tx1"/>
+                </a:solidFill>
+                <a:latin typeface="+mn-lt"/>
+                <a:ea typeface="+mn-ea"/>
+                <a:cs typeface="+mn-cs"/>
+              </a:defRPr>
+            </a:lvl9pPr>
+          </a:lstStyle>
           <a:p>
             <a:fld id="{B55BA10D-6FEA-4B85-B16C-84AFC53D9B6B}" type="datetime10">
               <a:rPr lang="en-IN" smtClean="0"/>
-              <a:t>14:03</a:t>
+              <a:pPr/>
+              <a:t>06:05</a:t>
             </a:fld>
-            <a:endParaRPr lang="en-IN"/>
+            <a:endParaRPr lang="en-IN" dirty="0"/>
           </a:p>
         </p:txBody>
       </p:sp>
@@ -3634,22 +4195,131 @@
       </p:grpSpPr>
       <p:sp>
         <p:nvSpPr>
-          <p:cNvPr id="4" name="Date Placeholder 3"/>
-          <p:cNvSpPr>
-            <a:spLocks noGrp="1"/>
-          </p:cNvSpPr>
-          <p:nvPr>
-            <p:ph type="dt" sz="half" idx="10"/>
-          </p:nvPr>
-        </p:nvSpPr>
-        <p:spPr/>
-        <p:txBody>
-          <a:bodyPr/>
-          <a:lstStyle/>
+          <p:cNvPr id="3" name="Date Placeholder 3">
+            <a:extLst>
+              <a:ext uri="{FF2B5EF4-FFF2-40B4-BE49-F238E27FC236}">
+                <a16:creationId xmlns:a16="http://schemas.microsoft.com/office/drawing/2014/main" id="{9E47B537-60AC-4D08-B678-5B9C16ADD543}"/>
+              </a:ext>
+            </a:extLst>
+          </p:cNvPr>
+          <p:cNvSpPr txBox="1">
+            <a:spLocks/>
+          </p:cNvSpPr>
+          <p:nvPr/>
+        </p:nvSpPr>
+        <p:spPr>
+          <a:xfrm>
+            <a:off x="457200" y="5991225"/>
+            <a:ext cx="2133600" cy="365125"/>
+          </a:xfrm>
+          <a:prstGeom prst="rect">
+            <a:avLst/>
+          </a:prstGeom>
+        </p:spPr>
+        <p:txBody>
+          <a:bodyPr vert="horz" lIns="91440" tIns="45720" rIns="91440" bIns="45720" rtlCol="0" anchor="ctr"/>
+          <a:lstStyle>
+            <a:defPPr>
+              <a:defRPr lang="en-US"/>
+            </a:defPPr>
+            <a:lvl1pPr marL="0" algn="l" defTabSz="914400" rtl="0" eaLnBrk="1" latinLnBrk="0" hangingPunct="1">
+              <a:defRPr sz="1200" kern="1200">
+                <a:solidFill>
+                  <a:schemeClr val="tx1">
+                    <a:tint val="75000"/>
+                  </a:schemeClr>
+                </a:solidFill>
+                <a:latin typeface="+mn-lt"/>
+                <a:ea typeface="+mn-ea"/>
+                <a:cs typeface="+mn-cs"/>
+              </a:defRPr>
+            </a:lvl1pPr>
+            <a:lvl2pPr marL="457200" algn="l" defTabSz="914400" rtl="0" eaLnBrk="1" latinLnBrk="0" hangingPunct="1">
+              <a:defRPr sz="1800" kern="1200">
+                <a:solidFill>
+                  <a:schemeClr val="tx1"/>
+                </a:solidFill>
+                <a:latin typeface="+mn-lt"/>
+                <a:ea typeface="+mn-ea"/>
+                <a:cs typeface="+mn-cs"/>
+              </a:defRPr>
+            </a:lvl2pPr>
+            <a:lvl3pPr marL="914400" algn="l" defTabSz="914400" rtl="0" eaLnBrk="1" latinLnBrk="0" hangingPunct="1">
+              <a:defRPr sz="1800" kern="1200">
+                <a:solidFill>
+                  <a:schemeClr val="tx1"/>
+                </a:solidFill>
+                <a:latin typeface="+mn-lt"/>
+                <a:ea typeface="+mn-ea"/>
+                <a:cs typeface="+mn-cs"/>
+              </a:defRPr>
+            </a:lvl3pPr>
+            <a:lvl4pPr marL="1371600" algn="l" defTabSz="914400" rtl="0" eaLnBrk="1" latinLnBrk="0" hangingPunct="1">
+              <a:defRPr sz="1800" kern="1200">
+                <a:solidFill>
+                  <a:schemeClr val="tx1"/>
+                </a:solidFill>
+                <a:latin typeface="+mn-lt"/>
+                <a:ea typeface="+mn-ea"/>
+                <a:cs typeface="+mn-cs"/>
+              </a:defRPr>
+            </a:lvl4pPr>
+            <a:lvl5pPr marL="1828800" algn="l" defTabSz="914400" rtl="0" eaLnBrk="1" latinLnBrk="0" hangingPunct="1">
+              <a:defRPr sz="1800" kern="1200">
+                <a:solidFill>
+                  <a:schemeClr val="tx1"/>
+                </a:solidFill>
+                <a:latin typeface="+mn-lt"/>
+                <a:ea typeface="+mn-ea"/>
+                <a:cs typeface="+mn-cs"/>
+              </a:defRPr>
+            </a:lvl5pPr>
+            <a:lvl6pPr marL="2286000" algn="l" defTabSz="914400" rtl="0" eaLnBrk="1" latinLnBrk="0" hangingPunct="1">
+              <a:defRPr sz="1800" kern="1200">
+                <a:solidFill>
+                  <a:schemeClr val="tx1"/>
+                </a:solidFill>
+                <a:latin typeface="+mn-lt"/>
+                <a:ea typeface="+mn-ea"/>
+                <a:cs typeface="+mn-cs"/>
+              </a:defRPr>
+            </a:lvl6pPr>
+            <a:lvl7pPr marL="2743200" algn="l" defTabSz="914400" rtl="0" eaLnBrk="1" latinLnBrk="0" hangingPunct="1">
+              <a:defRPr sz="1800" kern="1200">
+                <a:solidFill>
+                  <a:schemeClr val="tx1"/>
+                </a:solidFill>
+                <a:latin typeface="+mn-lt"/>
+                <a:ea typeface="+mn-ea"/>
+                <a:cs typeface="+mn-cs"/>
+              </a:defRPr>
+            </a:lvl7pPr>
+            <a:lvl8pPr marL="3200400" algn="l" defTabSz="914400" rtl="0" eaLnBrk="1" latinLnBrk="0" hangingPunct="1">
+              <a:defRPr sz="1800" kern="1200">
+                <a:solidFill>
+                  <a:schemeClr val="tx1"/>
+                </a:solidFill>
+                <a:latin typeface="+mn-lt"/>
+                <a:ea typeface="+mn-ea"/>
+                <a:cs typeface="+mn-cs"/>
+              </a:defRPr>
+            </a:lvl8pPr>
+            <a:lvl9pPr marL="3657600" algn="l" defTabSz="914400" rtl="0" eaLnBrk="1" latinLnBrk="0" hangingPunct="1">
+              <a:defRPr sz="1800" kern="1200">
+                <a:solidFill>
+                  <a:schemeClr val="tx1"/>
+                </a:solidFill>
+                <a:latin typeface="+mn-lt"/>
+                <a:ea typeface="+mn-ea"/>
+                <a:cs typeface="+mn-cs"/>
+              </a:defRPr>
+            </a:lvl9pPr>
+          </a:lstStyle>
           <a:p>
             <a:fld id="{30754031-A0BF-4DF0-81B6-C164E4893B5D}" type="datetime12">
               <a:rPr lang="en-IN" smtClean="0"/>
-              <a:t>2:03 PM</a:t>
+              <a:pPr/>
+              <a:t>6:05 AM</a:t>
             </a:fld>
             <a:endParaRPr lang="en-IN"/>
           </a:p>
@@ -3682,24 +4352,133 @@
       </p:grpSpPr>
       <p:sp>
         <p:nvSpPr>
-          <p:cNvPr id="4" name="Date Placeholder 3"/>
-          <p:cNvSpPr>
-            <a:spLocks noGrp="1"/>
-          </p:cNvSpPr>
-          <p:nvPr>
-            <p:ph type="dt" sz="half" idx="10"/>
-          </p:nvPr>
-        </p:nvSpPr>
-        <p:spPr/>
-        <p:txBody>
-          <a:bodyPr/>
-          <a:lstStyle/>
+          <p:cNvPr id="3" name="Date Placeholder 3">
+            <a:extLst>
+              <a:ext uri="{FF2B5EF4-FFF2-40B4-BE49-F238E27FC236}">
+                <a16:creationId xmlns:a16="http://schemas.microsoft.com/office/drawing/2014/main" id="{6AF08788-279A-40EB-A0EA-1FAD6C08BA0F}"/>
+              </a:ext>
+            </a:extLst>
+          </p:cNvPr>
+          <p:cNvSpPr txBox="1">
+            <a:spLocks/>
+          </p:cNvSpPr>
+          <p:nvPr/>
+        </p:nvSpPr>
+        <p:spPr>
+          <a:xfrm>
+            <a:off x="474306" y="5991225"/>
+            <a:ext cx="2133600" cy="365125"/>
+          </a:xfrm>
+          <a:prstGeom prst="rect">
+            <a:avLst/>
+          </a:prstGeom>
+        </p:spPr>
+        <p:txBody>
+          <a:bodyPr vert="horz" lIns="91440" tIns="45720" rIns="91440" bIns="45720" rtlCol="0" anchor="ctr"/>
+          <a:lstStyle>
+            <a:defPPr>
+              <a:defRPr lang="en-US"/>
+            </a:defPPr>
+            <a:lvl1pPr marL="0" algn="l" defTabSz="914400" rtl="0" eaLnBrk="1" latinLnBrk="0" hangingPunct="1">
+              <a:defRPr sz="1200" kern="1200">
+                <a:solidFill>
+                  <a:schemeClr val="tx1">
+                    <a:tint val="75000"/>
+                  </a:schemeClr>
+                </a:solidFill>
+                <a:latin typeface="+mn-lt"/>
+                <a:ea typeface="+mn-ea"/>
+                <a:cs typeface="+mn-cs"/>
+              </a:defRPr>
+            </a:lvl1pPr>
+            <a:lvl2pPr marL="457200" algn="l" defTabSz="914400" rtl="0" eaLnBrk="1" latinLnBrk="0" hangingPunct="1">
+              <a:defRPr sz="1800" kern="1200">
+                <a:solidFill>
+                  <a:schemeClr val="tx1"/>
+                </a:solidFill>
+                <a:latin typeface="+mn-lt"/>
+                <a:ea typeface="+mn-ea"/>
+                <a:cs typeface="+mn-cs"/>
+              </a:defRPr>
+            </a:lvl2pPr>
+            <a:lvl3pPr marL="914400" algn="l" defTabSz="914400" rtl="0" eaLnBrk="1" latinLnBrk="0" hangingPunct="1">
+              <a:defRPr sz="1800" kern="1200">
+                <a:solidFill>
+                  <a:schemeClr val="tx1"/>
+                </a:solidFill>
+                <a:latin typeface="+mn-lt"/>
+                <a:ea typeface="+mn-ea"/>
+                <a:cs typeface="+mn-cs"/>
+              </a:defRPr>
+            </a:lvl3pPr>
+            <a:lvl4pPr marL="1371600" algn="l" defTabSz="914400" rtl="0" eaLnBrk="1" latinLnBrk="0" hangingPunct="1">
+              <a:defRPr sz="1800" kern="1200">
+                <a:solidFill>
+                  <a:schemeClr val="tx1"/>
+                </a:solidFill>
+                <a:latin typeface="+mn-lt"/>
+                <a:ea typeface="+mn-ea"/>
+                <a:cs typeface="+mn-cs"/>
+              </a:defRPr>
+            </a:lvl4pPr>
+            <a:lvl5pPr marL="1828800" algn="l" defTabSz="914400" rtl="0" eaLnBrk="1" latinLnBrk="0" hangingPunct="1">
+              <a:defRPr sz="1800" kern="1200">
+                <a:solidFill>
+                  <a:schemeClr val="tx1"/>
+                </a:solidFill>
+                <a:latin typeface="+mn-lt"/>
+                <a:ea typeface="+mn-ea"/>
+                <a:cs typeface="+mn-cs"/>
+              </a:defRPr>
+            </a:lvl5pPr>
+            <a:lvl6pPr marL="2286000" algn="l" defTabSz="914400" rtl="0" eaLnBrk="1" latinLnBrk="0" hangingPunct="1">
+              <a:defRPr sz="1800" kern="1200">
+                <a:solidFill>
+                  <a:schemeClr val="tx1"/>
+                </a:solidFill>
+                <a:latin typeface="+mn-lt"/>
+                <a:ea typeface="+mn-ea"/>
+                <a:cs typeface="+mn-cs"/>
+              </a:defRPr>
+            </a:lvl6pPr>
+            <a:lvl7pPr marL="2743200" algn="l" defTabSz="914400" rtl="0" eaLnBrk="1" latinLnBrk="0" hangingPunct="1">
+              <a:defRPr sz="1800" kern="1200">
+                <a:solidFill>
+                  <a:schemeClr val="tx1"/>
+                </a:solidFill>
+                <a:latin typeface="+mn-lt"/>
+                <a:ea typeface="+mn-ea"/>
+                <a:cs typeface="+mn-cs"/>
+              </a:defRPr>
+            </a:lvl7pPr>
+            <a:lvl8pPr marL="3200400" algn="l" defTabSz="914400" rtl="0" eaLnBrk="1" latinLnBrk="0" hangingPunct="1">
+              <a:defRPr sz="1800" kern="1200">
+                <a:solidFill>
+                  <a:schemeClr val="tx1"/>
+                </a:solidFill>
+                <a:latin typeface="+mn-lt"/>
+                <a:ea typeface="+mn-ea"/>
+                <a:cs typeface="+mn-cs"/>
+              </a:defRPr>
+            </a:lvl8pPr>
+            <a:lvl9pPr marL="3657600" algn="l" defTabSz="914400" rtl="0" eaLnBrk="1" latinLnBrk="0" hangingPunct="1">
+              <a:defRPr sz="1800" kern="1200">
+                <a:solidFill>
+                  <a:schemeClr val="tx1"/>
+                </a:solidFill>
+                <a:latin typeface="+mn-lt"/>
+                <a:ea typeface="+mn-ea"/>
+                <a:cs typeface="+mn-cs"/>
+              </a:defRPr>
+            </a:lvl9pPr>
+          </a:lstStyle>
           <a:p>
             <a:fld id="{9153E46C-23F0-43BA-BEFC-F4F21F7D4FF7}" type="datetime13">
               <a:rPr lang="en-IN" smtClean="0"/>
-              <a:t>2:03:20 PM</a:t>
+              <a:pPr/>
+              <a:t>6:05:37 AM</a:t>
             </a:fld>
-            <a:endParaRPr lang="en-IN"/>
+            <a:endParaRPr lang="en-IN" dirty="0"/>
           </a:p>
         </p:txBody>
       </p:sp>

</xml_diff>

<commit_message>
tdf#59323 tdf#142221: fix pptx datetime import export format
fixed some problems from the original implementation of
pptx datetime field formatting
(e9f4db23288666f47f2c22c89735595d68e30f49)

also the comments on tests seemed to be based on en-IN which
seems to differ a lot for SvxDateFormat::StdBig. So converted
them to en-US's StdBig.

expanded the tests, so it covers previously poorly imported
types. Also made them use the SvxDateFormat and SvxTimeFormat

Change-Id: I675c482d3095b5373975abb2e6e7eca2d353243d
Reviewed-on: https://gerrit.libreoffice.org/c/core/+/118135
Tested-by: Jenkins
Reviewed-by: Jan Holesovsky <kendy@collabora.com>
</commit_message>
<xml_diff>
--- a/sd/qa/unit/data/pptx/numfmt.pptx
+++ b/sd/qa/unit/data/pptx/numfmt.pptx
@@ -5,7 +5,7 @@
     <p:sldMasterId id="2147483648" r:id="rId1"/>
   </p:sldMasterIdLst>
   <p:notesMasterIdLst>
-    <p:notesMasterId r:id="rId9"/>
+    <p:notesMasterId r:id="rId11"/>
   </p:notesMasterIdLst>
   <p:sldIdLst>
     <p:sldId id="256" r:id="rId2"/>
@@ -15,6 +15,8 @@
     <p:sldId id="260" r:id="rId6"/>
     <p:sldId id="261" r:id="rId7"/>
     <p:sldId id="262" r:id="rId8"/>
+    <p:sldId id="266" r:id="rId9"/>
+    <p:sldId id="267" r:id="rId10"/>
   </p:sldIdLst>
   <p:sldSz cx="9144000" cy="6858000" type="screen4x3"/>
   <p:notesSz cx="6858000" cy="9144000"/>
@@ -214,7 +216,7 @@
           <a:p>
             <a:fld id="{8C6B8BEB-E207-4B62-80DE-045147C8EED1}" type="datetimeFigureOut">
               <a:rPr lang="en-US" smtClean="0"/>
-              <a:t>6/9/2021</a:t>
+              <a:t>6/29/2021</a:t>
             </a:fld>
             <a:endParaRPr lang="en-IN"/>
           </a:p>
@@ -660,7 +662,7 @@
           <a:p>
             <a:fld id="{23270E89-3869-447B-8CDE-6FB960193F88}" type="datetime4">
               <a:rPr lang="en-IN" smtClean="0"/>
-              <a:t>09 June 2021</a:t>
+              <a:t>29 June 2021</a:t>
             </a:fld>
             <a:endParaRPr lang="en-IN"/>
           </a:p>
@@ -825,7 +827,7 @@
           <a:p>
             <a:fld id="{6EABF89B-1986-42A1-A443-E65C3BB5A974}" type="datetime4">
               <a:rPr lang="en-IN" smtClean="0"/>
-              <a:t>09 June 2021</a:t>
+              <a:t>29 June 2021</a:t>
             </a:fld>
             <a:endParaRPr lang="en-IN"/>
           </a:p>
@@ -1000,7 +1002,7 @@
           <a:p>
             <a:fld id="{95082EA7-CF00-425D-A785-BEE1492EBC19}" type="datetime4">
               <a:rPr lang="en-IN" smtClean="0"/>
-              <a:t>09 June 2021</a:t>
+              <a:t>29 June 2021</a:t>
             </a:fld>
             <a:endParaRPr lang="en-IN"/>
           </a:p>
@@ -1165,7 +1167,7 @@
           <a:p>
             <a:fld id="{A3CE591C-F2AE-4A99-929C-81B4BA8FF67E}" type="datetime4">
               <a:rPr lang="en-IN" smtClean="0"/>
-              <a:t>09 June 2021</a:t>
+              <a:t>29 June 2021</a:t>
             </a:fld>
             <a:endParaRPr lang="en-IN"/>
           </a:p>
@@ -1406,7 +1408,7 @@
           <a:p>
             <a:fld id="{F86C5339-AD76-4734-9F5A-207BF5C7804B}" type="datetime4">
               <a:rPr lang="en-IN" smtClean="0"/>
-              <a:t>09 June 2021</a:t>
+              <a:t>29 June 2021</a:t>
             </a:fld>
             <a:endParaRPr lang="en-IN"/>
           </a:p>
@@ -1689,7 +1691,7 @@
           <a:p>
             <a:fld id="{D3BF498F-A914-403B-9F2B-154CBF7F4BD6}" type="datetime4">
               <a:rPr lang="en-IN" smtClean="0"/>
-              <a:t>09 June 2021</a:t>
+              <a:t>29 June 2021</a:t>
             </a:fld>
             <a:endParaRPr lang="en-IN"/>
           </a:p>
@@ -2106,7 +2108,7 @@
           <a:p>
             <a:fld id="{0FA64DB0-35D1-47DE-A966-FB342CE5D43F}" type="datetime4">
               <a:rPr lang="en-IN" smtClean="0"/>
-              <a:t>09 June 2021</a:t>
+              <a:t>29 June 2021</a:t>
             </a:fld>
             <a:endParaRPr lang="en-IN"/>
           </a:p>
@@ -2219,7 +2221,7 @@
           <a:p>
             <a:fld id="{050A7ECC-F572-4B7D-B55D-FDBCDF289DD7}" type="datetime4">
               <a:rPr lang="en-IN" smtClean="0"/>
-              <a:t>09 June 2021</a:t>
+              <a:t>29 June 2021</a:t>
             </a:fld>
             <a:endParaRPr lang="en-IN"/>
           </a:p>
@@ -2309,7 +2311,7 @@
           <a:p>
             <a:fld id="{C672AD80-6BC8-4A11-8DC3-D28B0725072C}" type="datetime4">
               <a:rPr lang="en-IN" smtClean="0"/>
-              <a:t>09 June 2021</a:t>
+              <a:t>29 June 2021</a:t>
             </a:fld>
             <a:endParaRPr lang="en-IN"/>
           </a:p>
@@ -2581,7 +2583,7 @@
           <a:p>
             <a:fld id="{5049F6D9-A4E1-4F49-9147-7DFF8F63790F}" type="datetime4">
               <a:rPr lang="en-IN" smtClean="0"/>
-              <a:t>09 June 2021</a:t>
+              <a:t>29 June 2021</a:t>
             </a:fld>
             <a:endParaRPr lang="en-IN"/>
           </a:p>
@@ -2829,7 +2831,7 @@
           <a:p>
             <a:fld id="{9309A248-4888-4712-98BA-AB7B91A5E8A7}" type="datetime4">
               <a:rPr lang="en-IN" smtClean="0"/>
-              <a:t>09 June 2021</a:t>
+              <a:t>29 June 2021</a:t>
             </a:fld>
             <a:endParaRPr lang="en-IN"/>
           </a:p>
@@ -3037,7 +3039,7 @@
           <a:p>
             <a:fld id="{08F81F5D-EB0B-4B3A-9297-3DB9A8902B6D}" type="datetime4">
               <a:rPr lang="en-IN" smtClean="0"/>
-              <a:t>09 June 2021</a:t>
+              <a:t>29 June 2021</a:t>
             </a:fld>
             <a:endParaRPr lang="en-IN"/>
           </a:p>
@@ -3531,10 +3533,9 @@
             </a:lvl9pPr>
           </a:lstStyle>
           <a:p>
-            <a:fld id="{6F1FB038-ACEC-47F0-9348-1F0FFA4AC8CD}" type="datetime4">
-              <a:rPr lang="en-IN" smtClean="0"/>
-              <a:pPr/>
-              <a:t>09 June 2021</a:t>
+            <a:fld id="{CEAEABC4-396C-481A-9CD4-C3AD9DA4367E}" type="datetime">
+              <a:rPr lang="en-US" smtClean="0"/>
+              <a:t>6/29/2021</a:t>
             </a:fld>
             <a:endParaRPr lang="en-IN" dirty="0"/>
           </a:p>
@@ -3691,9 +3692,9 @@
             <a:fld id="{3D8552DC-8493-4C08-B339-F696EB9E8552}" type="datetime1">
               <a:rPr lang="en-IN" smtClean="0"/>
               <a:pPr/>
-              <a:t>09-06-2021</a:t>
+              <a:t>29-06-2021</a:t>
             </a:fld>
-            <a:endParaRPr lang="en-IN"/>
+            <a:endParaRPr lang="en-IN" dirty="0"/>
           </a:p>
         </p:txBody>
       </p:sp>
@@ -3845,10 +3846,9 @@
             </a:lvl9pPr>
           </a:lstStyle>
           <a:p>
-            <a:fld id="{310BA1B9-101E-4D36-903A-746CAFB854A5}" type="datetime3">
-              <a:rPr lang="en-IN" smtClean="0"/>
-              <a:pPr/>
-              <a:t>9 June 2021</a:t>
+            <a:fld id="{507DA771-C184-4A7C-BC09-830362A02FB8}" type="datetime2">
+              <a:rPr lang="en-US" smtClean="0"/>
+              <a:t>Tuesday, June 29, 2021</a:t>
             </a:fld>
             <a:endParaRPr lang="en-IN" dirty="0"/>
           </a:p>
@@ -4005,7 +4005,7 @@
             <a:fld id="{AB4092FF-6B6F-4C9C-8873-EF1E09B49560}" type="datetime11">
               <a:rPr lang="en-IN" smtClean="0"/>
               <a:pPr/>
-              <a:t>06:04:59</a:t>
+              <a:t>15:35:09</a:t>
             </a:fld>
             <a:endParaRPr lang="en-IN" dirty="0"/>
           </a:p>
@@ -4162,7 +4162,7 @@
             <a:fld id="{B55BA10D-6FEA-4B85-B16C-84AFC53D9B6B}" type="datetime10">
               <a:rPr lang="en-IN" smtClean="0"/>
               <a:pPr/>
-              <a:t>06:05</a:t>
+              <a:t>15:35</a:t>
             </a:fld>
             <a:endParaRPr lang="en-IN" dirty="0"/>
           </a:p>
@@ -4319,7 +4319,7 @@
             <a:fld id="{30754031-A0BF-4DF0-81B6-C164E4893B5D}" type="datetime12">
               <a:rPr lang="en-IN" smtClean="0"/>
               <a:pPr/>
-              <a:t>6:05 AM</a:t>
+              <a:t>3:35 PM</a:t>
             </a:fld>
             <a:endParaRPr lang="en-IN"/>
           </a:p>
@@ -4476,13 +4476,335 @@
             <a:fld id="{9153E46C-23F0-43BA-BEFC-F4F21F7D4FF7}" type="datetime13">
               <a:rPr lang="en-IN" smtClean="0"/>
               <a:pPr/>
-              <a:t>6:05:37 AM</a:t>
+              <a:t>3:35:09 PM</a:t>
             </a:fld>
             <a:endParaRPr lang="en-IN" dirty="0"/>
           </a:p>
         </p:txBody>
       </p:sp>
     </p:spTree>
+  </p:cSld>
+  <p:clrMapOvr>
+    <a:masterClrMapping/>
+  </p:clrMapOvr>
+</p:sld>
+</file>
+
+<file path=ppt/slides/slide8.xml><?xml version="1.0" encoding="utf-8"?>
+<p:sld xmlns:a="http://schemas.openxmlformats.org/drawingml/2006/main" xmlns:r="http://schemas.openxmlformats.org/officeDocument/2006/relationships" xmlns:p="http://schemas.openxmlformats.org/presentationml/2006/main">
+  <p:cSld>
+    <p:spTree>
+      <p:nvGrpSpPr>
+        <p:cNvPr id="1" name=""/>
+        <p:cNvGrpSpPr/>
+        <p:nvPr/>
+      </p:nvGrpSpPr>
+      <p:grpSpPr>
+        <a:xfrm>
+          <a:off x="0" y="0"/>
+          <a:ext cx="0" cy="0"/>
+          <a:chOff x="0" y="0"/>
+          <a:chExt cx="0" cy="0"/>
+        </a:xfrm>
+      </p:grpSpPr>
+      <p:sp>
+        <p:nvSpPr>
+          <p:cNvPr id="3" name="Date Placeholder 1">
+            <a:extLst>
+              <a:ext uri="{FF2B5EF4-FFF2-40B4-BE49-F238E27FC236}">
+                <a16:creationId xmlns:a16="http://schemas.microsoft.com/office/drawing/2014/main" id="{56B5A385-436B-4C08-8FEF-5AE76EB35A3C}"/>
+              </a:ext>
+            </a:extLst>
+          </p:cNvPr>
+          <p:cNvSpPr txBox="1">
+            <a:spLocks/>
+          </p:cNvSpPr>
+          <p:nvPr/>
+        </p:nvSpPr>
+        <p:spPr>
+          <a:xfrm>
+            <a:off x="381000" y="6172200"/>
+            <a:ext cx="2133600" cy="365125"/>
+          </a:xfrm>
+          <a:prstGeom prst="rect">
+            <a:avLst/>
+          </a:prstGeom>
+        </p:spPr>
+        <p:txBody>
+          <a:bodyPr vert="horz" lIns="91440" tIns="45720" rIns="91440" bIns="45720" rtlCol="0" anchor="ctr"/>
+          <a:lstStyle>
+            <a:defPPr>
+              <a:defRPr lang="en-US"/>
+            </a:defPPr>
+            <a:lvl1pPr marL="0" algn="l" defTabSz="914400" rtl="0" eaLnBrk="1" latinLnBrk="0" hangingPunct="1">
+              <a:defRPr sz="1200" kern="1200">
+                <a:solidFill>
+                  <a:schemeClr val="tx1">
+                    <a:tint val="75000"/>
+                  </a:schemeClr>
+                </a:solidFill>
+                <a:latin typeface="+mn-lt"/>
+                <a:ea typeface="+mn-ea"/>
+                <a:cs typeface="+mn-cs"/>
+              </a:defRPr>
+            </a:lvl1pPr>
+            <a:lvl2pPr marL="457200" algn="l" defTabSz="914400" rtl="0" eaLnBrk="1" latinLnBrk="0" hangingPunct="1">
+              <a:defRPr sz="1800" kern="1200">
+                <a:solidFill>
+                  <a:schemeClr val="tx1"/>
+                </a:solidFill>
+                <a:latin typeface="+mn-lt"/>
+                <a:ea typeface="+mn-ea"/>
+                <a:cs typeface="+mn-cs"/>
+              </a:defRPr>
+            </a:lvl2pPr>
+            <a:lvl3pPr marL="914400" algn="l" defTabSz="914400" rtl="0" eaLnBrk="1" latinLnBrk="0" hangingPunct="1">
+              <a:defRPr sz="1800" kern="1200">
+                <a:solidFill>
+                  <a:schemeClr val="tx1"/>
+                </a:solidFill>
+                <a:latin typeface="+mn-lt"/>
+                <a:ea typeface="+mn-ea"/>
+                <a:cs typeface="+mn-cs"/>
+              </a:defRPr>
+            </a:lvl3pPr>
+            <a:lvl4pPr marL="1371600" algn="l" defTabSz="914400" rtl="0" eaLnBrk="1" latinLnBrk="0" hangingPunct="1">
+              <a:defRPr sz="1800" kern="1200">
+                <a:solidFill>
+                  <a:schemeClr val="tx1"/>
+                </a:solidFill>
+                <a:latin typeface="+mn-lt"/>
+                <a:ea typeface="+mn-ea"/>
+                <a:cs typeface="+mn-cs"/>
+              </a:defRPr>
+            </a:lvl4pPr>
+            <a:lvl5pPr marL="1828800" algn="l" defTabSz="914400" rtl="0" eaLnBrk="1" latinLnBrk="0" hangingPunct="1">
+              <a:defRPr sz="1800" kern="1200">
+                <a:solidFill>
+                  <a:schemeClr val="tx1"/>
+                </a:solidFill>
+                <a:latin typeface="+mn-lt"/>
+                <a:ea typeface="+mn-ea"/>
+                <a:cs typeface="+mn-cs"/>
+              </a:defRPr>
+            </a:lvl5pPr>
+            <a:lvl6pPr marL="2286000" algn="l" defTabSz="914400" rtl="0" eaLnBrk="1" latinLnBrk="0" hangingPunct="1">
+              <a:defRPr sz="1800" kern="1200">
+                <a:solidFill>
+                  <a:schemeClr val="tx1"/>
+                </a:solidFill>
+                <a:latin typeface="+mn-lt"/>
+                <a:ea typeface="+mn-ea"/>
+                <a:cs typeface="+mn-cs"/>
+              </a:defRPr>
+            </a:lvl6pPr>
+            <a:lvl7pPr marL="2743200" algn="l" defTabSz="914400" rtl="0" eaLnBrk="1" latinLnBrk="0" hangingPunct="1">
+              <a:defRPr sz="1800" kern="1200">
+                <a:solidFill>
+                  <a:schemeClr val="tx1"/>
+                </a:solidFill>
+                <a:latin typeface="+mn-lt"/>
+                <a:ea typeface="+mn-ea"/>
+                <a:cs typeface="+mn-cs"/>
+              </a:defRPr>
+            </a:lvl7pPr>
+            <a:lvl8pPr marL="3200400" algn="l" defTabSz="914400" rtl="0" eaLnBrk="1" latinLnBrk="0" hangingPunct="1">
+              <a:defRPr sz="1800" kern="1200">
+                <a:solidFill>
+                  <a:schemeClr val="tx1"/>
+                </a:solidFill>
+                <a:latin typeface="+mn-lt"/>
+                <a:ea typeface="+mn-ea"/>
+                <a:cs typeface="+mn-cs"/>
+              </a:defRPr>
+            </a:lvl8pPr>
+            <a:lvl9pPr marL="3657600" algn="l" defTabSz="914400" rtl="0" eaLnBrk="1" latinLnBrk="0" hangingPunct="1">
+              <a:defRPr sz="1800" kern="1200">
+                <a:solidFill>
+                  <a:schemeClr val="tx1"/>
+                </a:solidFill>
+                <a:latin typeface="+mn-lt"/>
+                <a:ea typeface="+mn-ea"/>
+                <a:cs typeface="+mn-cs"/>
+              </a:defRPr>
+            </a:lvl9pPr>
+          </a:lstStyle>
+          <a:p>
+            <a:fld id="{139A6493-289B-444C-A9B3-BB83D0E53F85}" type="datetime6">
+              <a:rPr lang="en-US" smtClean="0"/>
+              <a:t>June 21</a:t>
+            </a:fld>
+            <a:endParaRPr lang="en-IN" dirty="0"/>
+          </a:p>
+        </p:txBody>
+      </p:sp>
+    </p:spTree>
+    <p:extLst>
+      <p:ext uri="{BB962C8B-B14F-4D97-AF65-F5344CB8AC3E}">
+        <p14:creationId xmlns:p14="http://schemas.microsoft.com/office/powerpoint/2010/main" val="1975714921"/>
+      </p:ext>
+    </p:extLst>
+  </p:cSld>
+  <p:clrMapOvr>
+    <a:masterClrMapping/>
+  </p:clrMapOvr>
+</p:sld>
+</file>
+
+<file path=ppt/slides/slide9.xml><?xml version="1.0" encoding="utf-8"?>
+<p:sld xmlns:a="http://schemas.openxmlformats.org/drawingml/2006/main" xmlns:r="http://schemas.openxmlformats.org/officeDocument/2006/relationships" xmlns:p="http://schemas.openxmlformats.org/presentationml/2006/main">
+  <p:cSld>
+    <p:spTree>
+      <p:nvGrpSpPr>
+        <p:cNvPr id="1" name=""/>
+        <p:cNvGrpSpPr/>
+        <p:nvPr/>
+      </p:nvGrpSpPr>
+      <p:grpSpPr>
+        <a:xfrm>
+          <a:off x="0" y="0"/>
+          <a:ext cx="0" cy="0"/>
+          <a:chOff x="0" y="0"/>
+          <a:chExt cx="0" cy="0"/>
+        </a:xfrm>
+      </p:grpSpPr>
+      <p:sp>
+        <p:nvSpPr>
+          <p:cNvPr id="3" name="Date Placeholder 1">
+            <a:extLst>
+              <a:ext uri="{FF2B5EF4-FFF2-40B4-BE49-F238E27FC236}">
+                <a16:creationId xmlns:a16="http://schemas.microsoft.com/office/drawing/2014/main" id="{2D90039A-6546-48C7-A22F-A37F0799B36F}"/>
+              </a:ext>
+            </a:extLst>
+          </p:cNvPr>
+          <p:cNvSpPr txBox="1">
+            <a:spLocks/>
+          </p:cNvSpPr>
+          <p:nvPr/>
+        </p:nvSpPr>
+        <p:spPr>
+          <a:xfrm>
+            <a:off x="609600" y="6455553"/>
+            <a:ext cx="2133600" cy="365125"/>
+          </a:xfrm>
+          <a:prstGeom prst="rect">
+            <a:avLst/>
+          </a:prstGeom>
+        </p:spPr>
+        <p:txBody>
+          <a:bodyPr vert="horz" lIns="91440" tIns="45720" rIns="91440" bIns="45720" rtlCol="0" anchor="ctr"/>
+          <a:lstStyle>
+            <a:defPPr>
+              <a:defRPr lang="en-US"/>
+            </a:defPPr>
+            <a:lvl1pPr marL="0" algn="l" defTabSz="914400" rtl="0" eaLnBrk="1" latinLnBrk="0" hangingPunct="1">
+              <a:defRPr sz="1200" kern="1200">
+                <a:solidFill>
+                  <a:schemeClr val="tx1">
+                    <a:tint val="75000"/>
+                  </a:schemeClr>
+                </a:solidFill>
+                <a:latin typeface="+mn-lt"/>
+                <a:ea typeface="+mn-ea"/>
+                <a:cs typeface="+mn-cs"/>
+              </a:defRPr>
+            </a:lvl1pPr>
+            <a:lvl2pPr marL="457200" algn="l" defTabSz="914400" rtl="0" eaLnBrk="1" latinLnBrk="0" hangingPunct="1">
+              <a:defRPr sz="1800" kern="1200">
+                <a:solidFill>
+                  <a:schemeClr val="tx1"/>
+                </a:solidFill>
+                <a:latin typeface="+mn-lt"/>
+                <a:ea typeface="+mn-ea"/>
+                <a:cs typeface="+mn-cs"/>
+              </a:defRPr>
+            </a:lvl2pPr>
+            <a:lvl3pPr marL="914400" algn="l" defTabSz="914400" rtl="0" eaLnBrk="1" latinLnBrk="0" hangingPunct="1">
+              <a:defRPr sz="1800" kern="1200">
+                <a:solidFill>
+                  <a:schemeClr val="tx1"/>
+                </a:solidFill>
+                <a:latin typeface="+mn-lt"/>
+                <a:ea typeface="+mn-ea"/>
+                <a:cs typeface="+mn-cs"/>
+              </a:defRPr>
+            </a:lvl3pPr>
+            <a:lvl4pPr marL="1371600" algn="l" defTabSz="914400" rtl="0" eaLnBrk="1" latinLnBrk="0" hangingPunct="1">
+              <a:defRPr sz="1800" kern="1200">
+                <a:solidFill>
+                  <a:schemeClr val="tx1"/>
+                </a:solidFill>
+                <a:latin typeface="+mn-lt"/>
+                <a:ea typeface="+mn-ea"/>
+                <a:cs typeface="+mn-cs"/>
+              </a:defRPr>
+            </a:lvl4pPr>
+            <a:lvl5pPr marL="1828800" algn="l" defTabSz="914400" rtl="0" eaLnBrk="1" latinLnBrk="0" hangingPunct="1">
+              <a:defRPr sz="1800" kern="1200">
+                <a:solidFill>
+                  <a:schemeClr val="tx1"/>
+                </a:solidFill>
+                <a:latin typeface="+mn-lt"/>
+                <a:ea typeface="+mn-ea"/>
+                <a:cs typeface="+mn-cs"/>
+              </a:defRPr>
+            </a:lvl5pPr>
+            <a:lvl6pPr marL="2286000" algn="l" defTabSz="914400" rtl="0" eaLnBrk="1" latinLnBrk="0" hangingPunct="1">
+              <a:defRPr sz="1800" kern="1200">
+                <a:solidFill>
+                  <a:schemeClr val="tx1"/>
+                </a:solidFill>
+                <a:latin typeface="+mn-lt"/>
+                <a:ea typeface="+mn-ea"/>
+                <a:cs typeface="+mn-cs"/>
+              </a:defRPr>
+            </a:lvl6pPr>
+            <a:lvl7pPr marL="2743200" algn="l" defTabSz="914400" rtl="0" eaLnBrk="1" latinLnBrk="0" hangingPunct="1">
+              <a:defRPr sz="1800" kern="1200">
+                <a:solidFill>
+                  <a:schemeClr val="tx1"/>
+                </a:solidFill>
+                <a:latin typeface="+mn-lt"/>
+                <a:ea typeface="+mn-ea"/>
+                <a:cs typeface="+mn-cs"/>
+              </a:defRPr>
+            </a:lvl7pPr>
+            <a:lvl8pPr marL="3200400" algn="l" defTabSz="914400" rtl="0" eaLnBrk="1" latinLnBrk="0" hangingPunct="1">
+              <a:defRPr sz="1800" kern="1200">
+                <a:solidFill>
+                  <a:schemeClr val="tx1"/>
+                </a:solidFill>
+                <a:latin typeface="+mn-lt"/>
+                <a:ea typeface="+mn-ea"/>
+                <a:cs typeface="+mn-cs"/>
+              </a:defRPr>
+            </a:lvl8pPr>
+            <a:lvl9pPr marL="3657600" algn="l" defTabSz="914400" rtl="0" eaLnBrk="1" latinLnBrk="0" hangingPunct="1">
+              <a:defRPr sz="1800" kern="1200">
+                <a:solidFill>
+                  <a:schemeClr val="tx1"/>
+                </a:solidFill>
+                <a:latin typeface="+mn-lt"/>
+                <a:ea typeface="+mn-ea"/>
+                <a:cs typeface="+mn-cs"/>
+              </a:defRPr>
+            </a:lvl9pPr>
+          </a:lstStyle>
+          <a:p>
+            <a:fld id="{DAFC9FF1-7498-4081-83BF-6A18529E002C}" type="datetime5">
+              <a:rPr lang="en-US" smtClean="0"/>
+              <a:t>29-Jun-21</a:t>
+            </a:fld>
+            <a:endParaRPr lang="en-IN" dirty="0"/>
+          </a:p>
+        </p:txBody>
+      </p:sp>
+    </p:spTree>
+    <p:extLst>
+      <p:ext uri="{BB962C8B-B14F-4D97-AF65-F5344CB8AC3E}">
+        <p14:creationId xmlns:p14="http://schemas.microsoft.com/office/powerpoint/2010/main" val="3407081504"/>
+      </p:ext>
+    </p:extLst>
   </p:cSld>
   <p:clrMapOvr>
     <a:masterClrMapping/>

</xml_diff>